<commit_message>
Updated to History of Program
</commit_message>
<xml_diff>
--- a/DSCI_at_WSU.pptx
+++ b/DSCI_at_WSU.pptx
@@ -7,11 +7,13 @@
   <p:sldIdLst>
     <p:sldId id="256" r:id="rId2"/>
     <p:sldId id="257" r:id="rId3"/>
-    <p:sldId id="258" r:id="rId4"/>
-    <p:sldId id="261" r:id="rId5"/>
-    <p:sldId id="262" r:id="rId6"/>
-    <p:sldId id="263" r:id="rId7"/>
-    <p:sldId id="264" r:id="rId8"/>
+    <p:sldId id="266" r:id="rId4"/>
+    <p:sldId id="265" r:id="rId5"/>
+    <p:sldId id="258" r:id="rId6"/>
+    <p:sldId id="261" r:id="rId7"/>
+    <p:sldId id="262" r:id="rId8"/>
+    <p:sldId id="263" r:id="rId9"/>
+    <p:sldId id="264" r:id="rId10"/>
   </p:sldIdLst>
   <p:sldSz cx="9144000" cy="6858000" type="screen4x3"/>
   <p:notesSz cx="6858000" cy="9144000"/>
@@ -110,6 +112,11 @@
       </a:defRPr>
     </a:lvl9pPr>
   </p:defaultTextStyle>
+  <p:extLst>
+    <p:ext uri="{EFAFB233-063F-42B5-8137-9DF3F51BA10A}">
+      <p15:sldGuideLst xmlns:p15="http://schemas.microsoft.com/office/powerpoint/2012/main"/>
+    </p:ext>
+  </p:extLst>
 </p:presentation>
 </file>
 
@@ -244,7 +251,7 @@
           <a:p>
             <a:fld id="{F68F9EC3-0CB5-C941-AEC8-2968140A65F4}" type="datetimeFigureOut">
               <a:rPr lang="en-US" smtClean="0"/>
-              <a:t>5/10/19</a:t>
+              <a:t>5/12/2019</a:t>
             </a:fld>
             <a:endParaRPr lang="en-US"/>
           </a:p>
@@ -414,7 +421,7 @@
           <a:p>
             <a:fld id="{F68F9EC3-0CB5-C941-AEC8-2968140A65F4}" type="datetimeFigureOut">
               <a:rPr lang="en-US" smtClean="0"/>
-              <a:t>5/10/19</a:t>
+              <a:t>5/12/2019</a:t>
             </a:fld>
             <a:endParaRPr lang="en-US"/>
           </a:p>
@@ -594,7 +601,7 @@
           <a:p>
             <a:fld id="{F68F9EC3-0CB5-C941-AEC8-2968140A65F4}" type="datetimeFigureOut">
               <a:rPr lang="en-US" smtClean="0"/>
-              <a:t>5/10/19</a:t>
+              <a:t>5/12/2019</a:t>
             </a:fld>
             <a:endParaRPr lang="en-US"/>
           </a:p>
@@ -764,7 +771,7 @@
           <a:p>
             <a:fld id="{F68F9EC3-0CB5-C941-AEC8-2968140A65F4}" type="datetimeFigureOut">
               <a:rPr lang="en-US" smtClean="0"/>
-              <a:t>5/10/19</a:t>
+              <a:t>5/12/2019</a:t>
             </a:fld>
             <a:endParaRPr lang="en-US"/>
           </a:p>
@@ -1008,7 +1015,7 @@
           <a:p>
             <a:fld id="{F68F9EC3-0CB5-C941-AEC8-2968140A65F4}" type="datetimeFigureOut">
               <a:rPr lang="en-US" smtClean="0"/>
-              <a:t>5/10/19</a:t>
+              <a:t>5/12/2019</a:t>
             </a:fld>
             <a:endParaRPr lang="en-US"/>
           </a:p>
@@ -1240,7 +1247,7 @@
           <a:p>
             <a:fld id="{F68F9EC3-0CB5-C941-AEC8-2968140A65F4}" type="datetimeFigureOut">
               <a:rPr lang="en-US" smtClean="0"/>
-              <a:t>5/10/19</a:t>
+              <a:t>5/12/2019</a:t>
             </a:fld>
             <a:endParaRPr lang="en-US"/>
           </a:p>
@@ -1607,7 +1614,7 @@
           <a:p>
             <a:fld id="{F68F9EC3-0CB5-C941-AEC8-2968140A65F4}" type="datetimeFigureOut">
               <a:rPr lang="en-US" smtClean="0"/>
-              <a:t>5/10/19</a:t>
+              <a:t>5/12/2019</a:t>
             </a:fld>
             <a:endParaRPr lang="en-US"/>
           </a:p>
@@ -1725,7 +1732,7 @@
           <a:p>
             <a:fld id="{F68F9EC3-0CB5-C941-AEC8-2968140A65F4}" type="datetimeFigureOut">
               <a:rPr lang="en-US" smtClean="0"/>
-              <a:t>5/10/19</a:t>
+              <a:t>5/12/2019</a:t>
             </a:fld>
             <a:endParaRPr lang="en-US"/>
           </a:p>
@@ -1820,7 +1827,7 @@
           <a:p>
             <a:fld id="{F68F9EC3-0CB5-C941-AEC8-2968140A65F4}" type="datetimeFigureOut">
               <a:rPr lang="en-US" smtClean="0"/>
-              <a:t>5/10/19</a:t>
+              <a:t>5/12/2019</a:t>
             </a:fld>
             <a:endParaRPr lang="en-US"/>
           </a:p>
@@ -2097,7 +2104,7 @@
           <a:p>
             <a:fld id="{F68F9EC3-0CB5-C941-AEC8-2968140A65F4}" type="datetimeFigureOut">
               <a:rPr lang="en-US" smtClean="0"/>
-              <a:t>5/10/19</a:t>
+              <a:t>5/12/2019</a:t>
             </a:fld>
             <a:endParaRPr lang="en-US"/>
           </a:p>
@@ -2354,7 +2361,7 @@
           <a:p>
             <a:fld id="{F68F9EC3-0CB5-C941-AEC8-2968140A65F4}" type="datetimeFigureOut">
               <a:rPr lang="en-US" smtClean="0"/>
-              <a:t>5/10/19</a:t>
+              <a:t>5/12/2019</a:t>
             </a:fld>
             <a:endParaRPr lang="en-US"/>
           </a:p>
@@ -2567,7 +2574,7 @@
           <a:p>
             <a:fld id="{F68F9EC3-0CB5-C941-AEC8-2968140A65F4}" type="datetimeFigureOut">
               <a:rPr lang="en-US" smtClean="0"/>
-              <a:t>5/10/19</a:t>
+              <a:t>5/12/2019</a:t>
             </a:fld>
             <a:endParaRPr lang="en-US"/>
           </a:p>
@@ -3068,6 +3075,477 @@
           <a:chExt cx="0" cy="0"/>
         </a:xfrm>
       </p:grpSpPr>
+      <p:graphicFrame>
+        <p:nvGraphicFramePr>
+          <p:cNvPr id="5" name="Table 4"/>
+          <p:cNvGraphicFramePr>
+            <a:graphicFrameLocks noGrp="1"/>
+          </p:cNvGraphicFramePr>
+          <p:nvPr>
+            <p:extLst>
+              <p:ext uri="{D42A27DB-BD31-4B8C-83A1-F6EECF244321}">
+                <p14:modId xmlns:p14="http://schemas.microsoft.com/office/powerpoint/2010/main" val="1729948024"/>
+              </p:ext>
+            </p:extLst>
+          </p:nvPr>
+        </p:nvGraphicFramePr>
+        <p:xfrm>
+          <a:off x="1094248" y="3837711"/>
+          <a:ext cx="7057734" cy="1432560"/>
+        </p:xfrm>
+        <a:graphic>
+          <a:graphicData uri="http://schemas.openxmlformats.org/drawingml/2006/table">
+            <a:tbl>
+              <a:tblPr firstRow="1" bandRow="1">
+                <a:tableStyleId>{5C22544A-7EE6-4342-B048-85BDC9FD1C3A}</a:tableStyleId>
+              </a:tblPr>
+              <a:tblGrid>
+                <a:gridCol w="751488">
+                  <a:extLst>
+                    <a:ext uri="{9D8B030D-6E8A-4147-A177-3AD203B41FA5}">
+                      <a16:colId xmlns:a16="http://schemas.microsoft.com/office/drawing/2014/main" val="2410909952"/>
+                    </a:ext>
+                  </a:extLst>
+                </a:gridCol>
+                <a:gridCol w="947141">
+                  <a:extLst>
+                    <a:ext uri="{9D8B030D-6E8A-4147-A177-3AD203B41FA5}">
+                      <a16:colId xmlns:a16="http://schemas.microsoft.com/office/drawing/2014/main" val="3698387799"/>
+                    </a:ext>
+                  </a:extLst>
+                </a:gridCol>
+                <a:gridCol w="986049">
+                  <a:extLst>
+                    <a:ext uri="{9D8B030D-6E8A-4147-A177-3AD203B41FA5}">
+                      <a16:colId xmlns:a16="http://schemas.microsoft.com/office/drawing/2014/main" val="553780359"/>
+                    </a:ext>
+                  </a:extLst>
+                </a:gridCol>
+                <a:gridCol w="964204">
+                  <a:extLst>
+                    <a:ext uri="{9D8B030D-6E8A-4147-A177-3AD203B41FA5}">
+                      <a16:colId xmlns:a16="http://schemas.microsoft.com/office/drawing/2014/main" val="3255666325"/>
+                    </a:ext>
+                  </a:extLst>
+                </a:gridCol>
+                <a:gridCol w="972355">
+                  <a:extLst>
+                    <a:ext uri="{9D8B030D-6E8A-4147-A177-3AD203B41FA5}">
+                      <a16:colId xmlns:a16="http://schemas.microsoft.com/office/drawing/2014/main" val="2512516708"/>
+                    </a:ext>
+                  </a:extLst>
+                </a:gridCol>
+                <a:gridCol w="907639">
+                  <a:extLst>
+                    <a:ext uri="{9D8B030D-6E8A-4147-A177-3AD203B41FA5}">
+                      <a16:colId xmlns:a16="http://schemas.microsoft.com/office/drawing/2014/main" val="3751244542"/>
+                    </a:ext>
+                  </a:extLst>
+                </a:gridCol>
+                <a:gridCol w="877322">
+                  <a:extLst>
+                    <a:ext uri="{9D8B030D-6E8A-4147-A177-3AD203B41FA5}">
+                      <a16:colId xmlns:a16="http://schemas.microsoft.com/office/drawing/2014/main" val="4261644473"/>
+                    </a:ext>
+                  </a:extLst>
+                </a:gridCol>
+                <a:gridCol w="651536">
+                  <a:extLst>
+                    <a:ext uri="{9D8B030D-6E8A-4147-A177-3AD203B41FA5}">
+                      <a16:colId xmlns:a16="http://schemas.microsoft.com/office/drawing/2014/main" val="1060861164"/>
+                    </a:ext>
+                  </a:extLst>
+                </a:gridCol>
+              </a:tblGrid>
+              <a:tr h="370840">
+                <a:tc gridSpan="2">
+                  <a:txBody>
+                    <a:bodyPr/>
+                    <a:lstStyle/>
+                    <a:p>
+                      <a:pPr algn="ctr"/>
+                      <a:endParaRPr lang="en-US" dirty="0"/>
+                    </a:p>
+                  </a:txBody>
+                  <a:tcPr>
+                    <a:solidFill>
+                      <a:schemeClr val="bg1"/>
+                    </a:solidFill>
+                  </a:tcPr>
+                </a:tc>
+                <a:tc hMerge="1">
+                  <a:txBody>
+                    <a:bodyPr/>
+                    <a:lstStyle/>
+                    <a:p>
+                      <a:pPr algn="ctr"/>
+                      <a:endParaRPr lang="en-US" dirty="0"/>
+                    </a:p>
+                  </a:txBody>
+                  <a:tcPr/>
+                </a:tc>
+                <a:tc>
+                  <a:txBody>
+                    <a:bodyPr/>
+                    <a:lstStyle/>
+                    <a:p>
+                      <a:pPr algn="ctr"/>
+                      <a:r>
+                        <a:rPr lang="en-US" dirty="0" smtClean="0"/>
+                        <a:t>‘14-’15</a:t>
+                      </a:r>
+                      <a:endParaRPr lang="en-US" dirty="0"/>
+                    </a:p>
+                  </a:txBody>
+                  <a:tcPr>
+                    <a:solidFill>
+                      <a:schemeClr val="bg1"/>
+                    </a:solidFill>
+                  </a:tcPr>
+                </a:tc>
+                <a:tc>
+                  <a:txBody>
+                    <a:bodyPr/>
+                    <a:lstStyle/>
+                    <a:p>
+                      <a:pPr marL="0" marR="0" lvl="0" indent="0" algn="ctr" defTabSz="914400" rtl="0" eaLnBrk="1" fontAlgn="auto" latinLnBrk="0" hangingPunct="1">
+                        <a:lnSpc>
+                          <a:spcPct val="100000"/>
+                        </a:lnSpc>
+                        <a:spcBef>
+                          <a:spcPts val="0"/>
+                        </a:spcBef>
+                        <a:spcAft>
+                          <a:spcPts val="0"/>
+                        </a:spcAft>
+                        <a:buClrTx/>
+                        <a:buSzTx/>
+                        <a:buFontTx/>
+                        <a:buNone/>
+                        <a:tabLst/>
+                        <a:defRPr/>
+                      </a:pPr>
+                      <a:r>
+                        <a:rPr lang="en-US" dirty="0" smtClean="0"/>
+                        <a:t>‘</a:t>
+                      </a:r>
+                      <a:r>
+                        <a:rPr lang="en-US" dirty="0" smtClean="0"/>
+                        <a:t>15-’2416</a:t>
+                      </a:r>
+                      <a:endParaRPr lang="en-US" dirty="0" smtClean="0"/>
+                    </a:p>
+                  </a:txBody>
+                  <a:tcPr>
+                    <a:solidFill>
+                      <a:schemeClr val="bg1"/>
+                    </a:solidFill>
+                  </a:tcPr>
+                </a:tc>
+                <a:tc>
+                  <a:txBody>
+                    <a:bodyPr/>
+                    <a:lstStyle/>
+                    <a:p>
+                      <a:pPr algn="ctr"/>
+                      <a:r>
+                        <a:rPr lang="en-US" dirty="0" smtClean="0"/>
+                        <a:t>‘16-’17</a:t>
+                      </a:r>
+                      <a:endParaRPr lang="en-US" dirty="0"/>
+                    </a:p>
+                  </a:txBody>
+                  <a:tcPr>
+                    <a:solidFill>
+                      <a:schemeClr val="bg1"/>
+                    </a:solidFill>
+                  </a:tcPr>
+                </a:tc>
+                <a:tc>
+                  <a:txBody>
+                    <a:bodyPr/>
+                    <a:lstStyle/>
+                    <a:p>
+                      <a:pPr algn="ctr"/>
+                      <a:r>
+                        <a:rPr lang="en-US" dirty="0" smtClean="0"/>
+                        <a:t>‘17-’18</a:t>
+                      </a:r>
+                      <a:endParaRPr lang="en-US" dirty="0"/>
+                    </a:p>
+                  </a:txBody>
+                  <a:tcPr>
+                    <a:solidFill>
+                      <a:schemeClr val="bg1"/>
+                    </a:solidFill>
+                  </a:tcPr>
+                </a:tc>
+                <a:tc>
+                  <a:txBody>
+                    <a:bodyPr/>
+                    <a:lstStyle/>
+                    <a:p>
+                      <a:pPr algn="ctr"/>
+                      <a:r>
+                        <a:rPr lang="en-US" dirty="0" smtClean="0"/>
+                        <a:t>‘18-’19</a:t>
+                      </a:r>
+                      <a:endParaRPr lang="en-US" dirty="0"/>
+                    </a:p>
+                  </a:txBody>
+                  <a:tcPr>
+                    <a:solidFill>
+                      <a:schemeClr val="bg1"/>
+                    </a:solidFill>
+                  </a:tcPr>
+                </a:tc>
+                <a:tc>
+                  <a:txBody>
+                    <a:bodyPr/>
+                    <a:lstStyle/>
+                    <a:p>
+                      <a:pPr algn="ctr"/>
+                      <a:r>
+                        <a:rPr lang="en-US" dirty="0" smtClean="0"/>
+                        <a:t>Total</a:t>
+                      </a:r>
+                      <a:endParaRPr lang="en-US" dirty="0"/>
+                    </a:p>
+                  </a:txBody>
+                  <a:tcPr>
+                    <a:solidFill>
+                      <a:schemeClr val="bg1"/>
+                    </a:solidFill>
+                  </a:tcPr>
+                </a:tc>
+                <a:extLst>
+                  <a:ext uri="{0D108BD9-81ED-4DB2-BD59-A6C34878D82A}">
+                    <a16:rowId xmlns:a16="http://schemas.microsoft.com/office/drawing/2014/main" val="1267159179"/>
+                  </a:ext>
+                </a:extLst>
+              </a:tr>
+              <a:tr h="370840">
+                <a:tc rowSpan="2">
+                  <a:txBody>
+                    <a:bodyPr/>
+                    <a:lstStyle/>
+                    <a:p>
+                      <a:r>
+                        <a:rPr lang="en-US" sz="1800" dirty="0" smtClean="0"/>
+                        <a:t>STAT</a:t>
+                      </a:r>
+                      <a:endParaRPr lang="en-US" sz="1800" dirty="0"/>
+                    </a:p>
+                  </a:txBody>
+                  <a:tcPr/>
+                </a:tc>
+                <a:tc>
+                  <a:txBody>
+                    <a:bodyPr/>
+                    <a:lstStyle/>
+                    <a:p>
+                      <a:r>
+                        <a:rPr lang="en-US" sz="1800" dirty="0" smtClean="0"/>
+                        <a:t>Majors</a:t>
+                      </a:r>
+                      <a:endParaRPr lang="en-US" sz="1800" dirty="0"/>
+                    </a:p>
+                  </a:txBody>
+                  <a:tcPr/>
+                </a:tc>
+                <a:tc>
+                  <a:txBody>
+                    <a:bodyPr/>
+                    <a:lstStyle/>
+                    <a:p>
+                      <a:pPr algn="ctr"/>
+                      <a:r>
+                        <a:rPr lang="en-US" sz="2000" dirty="0" smtClean="0"/>
+                        <a:t>12</a:t>
+                      </a:r>
+                      <a:endParaRPr lang="en-US" sz="2000" dirty="0"/>
+                    </a:p>
+                  </a:txBody>
+                  <a:tcPr/>
+                </a:tc>
+                <a:tc>
+                  <a:txBody>
+                    <a:bodyPr/>
+                    <a:lstStyle/>
+                    <a:p>
+                      <a:pPr algn="ctr"/>
+                      <a:r>
+                        <a:rPr lang="en-US" sz="2000" dirty="0" smtClean="0"/>
+                        <a:t>12</a:t>
+                      </a:r>
+                      <a:endParaRPr lang="en-US" sz="2000" dirty="0"/>
+                    </a:p>
+                  </a:txBody>
+                  <a:tcPr/>
+                </a:tc>
+                <a:tc>
+                  <a:txBody>
+                    <a:bodyPr/>
+                    <a:lstStyle/>
+                    <a:p>
+                      <a:pPr algn="ctr"/>
+                      <a:r>
+                        <a:rPr lang="en-US" sz="2000" dirty="0" smtClean="0"/>
+                        <a:t>8</a:t>
+                      </a:r>
+                      <a:endParaRPr lang="en-US" sz="2000" dirty="0"/>
+                    </a:p>
+                  </a:txBody>
+                  <a:tcPr/>
+                </a:tc>
+                <a:tc>
+                  <a:txBody>
+                    <a:bodyPr/>
+                    <a:lstStyle/>
+                    <a:p>
+                      <a:pPr algn="ctr"/>
+                      <a:r>
+                        <a:rPr lang="en-US" sz="2000" dirty="0" smtClean="0"/>
+                        <a:t>15</a:t>
+                      </a:r>
+                      <a:endParaRPr lang="en-US" sz="2000" dirty="0"/>
+                    </a:p>
+                  </a:txBody>
+                  <a:tcPr/>
+                </a:tc>
+                <a:tc>
+                  <a:txBody>
+                    <a:bodyPr/>
+                    <a:lstStyle/>
+                    <a:p>
+                      <a:pPr algn="ctr"/>
+                      <a:r>
+                        <a:rPr lang="en-US" sz="2000" dirty="0" smtClean="0"/>
+                        <a:t>14</a:t>
+                      </a:r>
+                      <a:endParaRPr lang="en-US" sz="2000" dirty="0"/>
+                    </a:p>
+                  </a:txBody>
+                  <a:tcPr/>
+                </a:tc>
+                <a:tc>
+                  <a:txBody>
+                    <a:bodyPr/>
+                    <a:lstStyle/>
+                    <a:p>
+                      <a:pPr algn="ctr"/>
+                      <a:r>
+                        <a:rPr lang="en-US" sz="2000" dirty="0" smtClean="0"/>
+                        <a:t>61</a:t>
+                      </a:r>
+                      <a:endParaRPr lang="en-US" sz="2000" dirty="0"/>
+                    </a:p>
+                  </a:txBody>
+                  <a:tcPr/>
+                </a:tc>
+                <a:extLst>
+                  <a:ext uri="{0D108BD9-81ED-4DB2-BD59-A6C34878D82A}">
+                    <a16:rowId xmlns:a16="http://schemas.microsoft.com/office/drawing/2014/main" val="3233485116"/>
+                  </a:ext>
+                </a:extLst>
+              </a:tr>
+              <a:tr h="370840">
+                <a:tc vMerge="1">
+                  <a:txBody>
+                    <a:bodyPr/>
+                    <a:lstStyle/>
+                    <a:p>
+                      <a:endParaRPr lang="en-US" sz="1800" dirty="0"/>
+                    </a:p>
+                  </a:txBody>
+                  <a:tcPr/>
+                </a:tc>
+                <a:tc>
+                  <a:txBody>
+                    <a:bodyPr/>
+                    <a:lstStyle/>
+                    <a:p>
+                      <a:endParaRPr lang="en-US" sz="1800" dirty="0"/>
+                    </a:p>
+                  </a:txBody>
+                  <a:tcPr/>
+                </a:tc>
+                <a:tc>
+                  <a:txBody>
+                    <a:bodyPr/>
+                    <a:lstStyle/>
+                    <a:p>
+                      <a:pPr algn="ctr"/>
+                      <a:endParaRPr lang="en-US" sz="2000" dirty="0"/>
+                    </a:p>
+                  </a:txBody>
+                  <a:tcPr/>
+                </a:tc>
+                <a:tc>
+                  <a:txBody>
+                    <a:bodyPr/>
+                    <a:lstStyle/>
+                    <a:p>
+                      <a:pPr algn="ctr"/>
+                      <a:endParaRPr lang="en-US" sz="2000" dirty="0"/>
+                    </a:p>
+                  </a:txBody>
+                  <a:tcPr/>
+                </a:tc>
+                <a:tc>
+                  <a:txBody>
+                    <a:bodyPr/>
+                    <a:lstStyle/>
+                    <a:p>
+                      <a:pPr algn="ctr"/>
+                      <a:endParaRPr lang="en-US" sz="2000" dirty="0"/>
+                    </a:p>
+                  </a:txBody>
+                  <a:tcPr/>
+                </a:tc>
+                <a:tc>
+                  <a:txBody>
+                    <a:bodyPr/>
+                    <a:lstStyle/>
+                    <a:p>
+                      <a:pPr algn="ctr"/>
+                      <a:endParaRPr lang="en-US" sz="2000" dirty="0"/>
+                    </a:p>
+                  </a:txBody>
+                  <a:tcPr/>
+                </a:tc>
+                <a:tc>
+                  <a:txBody>
+                    <a:bodyPr/>
+                    <a:lstStyle/>
+                    <a:p>
+                      <a:pPr algn="ctr"/>
+                      <a:endParaRPr lang="en-US" sz="2000" dirty="0"/>
+                    </a:p>
+                  </a:txBody>
+                  <a:tcPr/>
+                </a:tc>
+                <a:tc>
+                  <a:txBody>
+                    <a:bodyPr/>
+                    <a:lstStyle/>
+                    <a:p>
+                      <a:pPr algn="ctr"/>
+                      <a:endParaRPr lang="en-US" sz="2000" dirty="0"/>
+                    </a:p>
+                  </a:txBody>
+                  <a:tcPr/>
+                </a:tc>
+                <a:extLst>
+                  <a:ext uri="{0D108BD9-81ED-4DB2-BD59-A6C34878D82A}">
+                    <a16:rowId xmlns:a16="http://schemas.microsoft.com/office/drawing/2014/main" val="1702215844"/>
+                  </a:ext>
+                </a:extLst>
+              </a:tr>
+            </a:tbl>
+          </a:graphicData>
+        </a:graphic>
+      </p:graphicFrame>
       <p:sp>
         <p:nvSpPr>
           <p:cNvPr id="2" name="Title 1">
@@ -3097,8 +3575,12 @@
               <a:rPr lang="en-US" dirty="0"/>
             </a:br>
             <a:r>
+              <a:rPr lang="en-US" sz="3200" dirty="0" smtClean="0"/>
+              <a:t>A Little </a:t>
+            </a:r>
+            <a:r>
               <a:rPr lang="en-US" sz="3200" dirty="0"/>
-              <a:t>A History</a:t>
+              <a:t>History</a:t>
             </a:r>
           </a:p>
         </p:txBody>
@@ -3121,69 +3603,489 @@
         </p:nvSpPr>
         <p:spPr/>
         <p:txBody>
-          <a:bodyPr/>
+          <a:bodyPr>
+            <a:normAutofit/>
+          </a:bodyPr>
           <a:lstStyle/>
           <a:p>
             <a:r>
               <a:rPr lang="en-US" dirty="0"/>
-              <a:t>Started in the fall of 2014</a:t>
+              <a:t>Started </a:t>
+            </a:r>
+            <a:r>
+              <a:rPr lang="en-US" dirty="0" smtClean="0"/>
+              <a:t>Fall 2014</a:t>
+            </a:r>
+            <a:endParaRPr lang="en-US" dirty="0"/>
+          </a:p>
+          <a:p>
+            <a:r>
+              <a:rPr lang="en-US" dirty="0" smtClean="0"/>
+              <a:t>Program Growth</a:t>
             </a:r>
           </a:p>
           <a:p>
-            <a:r>
-              <a:rPr lang="en-US" dirty="0"/>
-              <a:t>Growing program</a:t>
-            </a:r>
+            <a:pPr marL="0" indent="0">
+              <a:buNone/>
+            </a:pPr>
+            <a:endParaRPr lang="en-US" dirty="0"/>
           </a:p>
           <a:p>
-            <a:pPr lvl="1"/>
-            <a:r>
-              <a:rPr lang="en-US" dirty="0"/>
-              <a:t>?? Graduates so far</a:t>
-            </a:r>
+            <a:pPr marL="457200" lvl="1" indent="0">
+              <a:buNone/>
+            </a:pPr>
+            <a:endParaRPr lang="en-US" dirty="0"/>
           </a:p>
           <a:p>
-            <a:pPr lvl="1"/>
-            <a:r>
-              <a:rPr lang="en-US" dirty="0"/>
-              <a:t>20(??) graduates next year</a:t>
-            </a:r>
-          </a:p>
-          <a:p>
-            <a:r>
-              <a:rPr lang="en-US" dirty="0"/>
-              <a:t>Start as a mix of CS + DSCI + STAT courses</a:t>
-            </a:r>
-          </a:p>
-          <a:p>
-            <a:pPr lvl="1"/>
-            <a:r>
-              <a:rPr lang="en-US" dirty="0"/>
-              <a:t>Four DSCI at the start</a:t>
-            </a:r>
-          </a:p>
-          <a:p>
-            <a:r>
-              <a:rPr lang="en-US" dirty="0"/>
-              <a:t>Continued growth</a:t>
-            </a:r>
-          </a:p>
-          <a:p>
-            <a:pPr lvl="1"/>
-            <a:r>
-              <a:rPr lang="en-US" dirty="0"/>
-              <a:t>Added 3 new DSCI courses</a:t>
-            </a:r>
-          </a:p>
-          <a:p>
-            <a:pPr lvl="1"/>
-            <a:r>
-              <a:rPr lang="en-US" dirty="0"/>
-              <a:t>Plans for a math of DSCI and DSCI 101 Gen. Ed. course</a:t>
-            </a:r>
+            <a:pPr marL="0" indent="0">
+              <a:buNone/>
+            </a:pPr>
+            <a:endParaRPr lang="en-US" dirty="0" smtClean="0"/>
           </a:p>
         </p:txBody>
       </p:sp>
+      <p:graphicFrame>
+        <p:nvGraphicFramePr>
+          <p:cNvPr id="4" name="Table 3"/>
+          <p:cNvGraphicFramePr>
+            <a:graphicFrameLocks noGrp="1"/>
+          </p:cNvGraphicFramePr>
+          <p:nvPr>
+            <p:extLst>
+              <p:ext uri="{D42A27DB-BD31-4B8C-83A1-F6EECF244321}">
+                <p14:modId xmlns:p14="http://schemas.microsoft.com/office/powerpoint/2010/main" val="1233570755"/>
+              </p:ext>
+            </p:extLst>
+          </p:nvPr>
+        </p:nvGraphicFramePr>
+        <p:xfrm>
+          <a:off x="1094248" y="3043898"/>
+          <a:ext cx="7057734" cy="1163320"/>
+        </p:xfrm>
+        <a:graphic>
+          <a:graphicData uri="http://schemas.openxmlformats.org/drawingml/2006/table">
+            <a:tbl>
+              <a:tblPr firstRow="1" bandRow="1">
+                <a:tableStyleId>{5C22544A-7EE6-4342-B048-85BDC9FD1C3A}</a:tableStyleId>
+              </a:tblPr>
+              <a:tblGrid>
+                <a:gridCol w="751488">
+                  <a:extLst>
+                    <a:ext uri="{9D8B030D-6E8A-4147-A177-3AD203B41FA5}">
+                      <a16:colId xmlns:a16="http://schemas.microsoft.com/office/drawing/2014/main" val="3277107595"/>
+                    </a:ext>
+                  </a:extLst>
+                </a:gridCol>
+                <a:gridCol w="947141">
+                  <a:extLst>
+                    <a:ext uri="{9D8B030D-6E8A-4147-A177-3AD203B41FA5}">
+                      <a16:colId xmlns:a16="http://schemas.microsoft.com/office/drawing/2014/main" val="109790636"/>
+                    </a:ext>
+                  </a:extLst>
+                </a:gridCol>
+                <a:gridCol w="986049">
+                  <a:extLst>
+                    <a:ext uri="{9D8B030D-6E8A-4147-A177-3AD203B41FA5}">
+                      <a16:colId xmlns:a16="http://schemas.microsoft.com/office/drawing/2014/main" val="2977520167"/>
+                    </a:ext>
+                  </a:extLst>
+                </a:gridCol>
+                <a:gridCol w="964204">
+                  <a:extLst>
+                    <a:ext uri="{9D8B030D-6E8A-4147-A177-3AD203B41FA5}">
+                      <a16:colId xmlns:a16="http://schemas.microsoft.com/office/drawing/2014/main" val="4099176073"/>
+                    </a:ext>
+                  </a:extLst>
+                </a:gridCol>
+                <a:gridCol w="972355">
+                  <a:extLst>
+                    <a:ext uri="{9D8B030D-6E8A-4147-A177-3AD203B41FA5}">
+                      <a16:colId xmlns:a16="http://schemas.microsoft.com/office/drawing/2014/main" val="2459809661"/>
+                    </a:ext>
+                  </a:extLst>
+                </a:gridCol>
+                <a:gridCol w="907639">
+                  <a:extLst>
+                    <a:ext uri="{9D8B030D-6E8A-4147-A177-3AD203B41FA5}">
+                      <a16:colId xmlns:a16="http://schemas.microsoft.com/office/drawing/2014/main" val="1637044074"/>
+                    </a:ext>
+                  </a:extLst>
+                </a:gridCol>
+                <a:gridCol w="877322">
+                  <a:extLst>
+                    <a:ext uri="{9D8B030D-6E8A-4147-A177-3AD203B41FA5}">
+                      <a16:colId xmlns:a16="http://schemas.microsoft.com/office/drawing/2014/main" val="1376920956"/>
+                    </a:ext>
+                  </a:extLst>
+                </a:gridCol>
+                <a:gridCol w="651536">
+                  <a:extLst>
+                    <a:ext uri="{9D8B030D-6E8A-4147-A177-3AD203B41FA5}">
+                      <a16:colId xmlns:a16="http://schemas.microsoft.com/office/drawing/2014/main" val="2037266424"/>
+                    </a:ext>
+                  </a:extLst>
+                </a:gridCol>
+              </a:tblGrid>
+              <a:tr h="370840">
+                <a:tc gridSpan="2">
+                  <a:txBody>
+                    <a:bodyPr/>
+                    <a:lstStyle/>
+                    <a:p>
+                      <a:pPr algn="ctr"/>
+                      <a:r>
+                        <a:rPr lang="en-US" dirty="0" smtClean="0"/>
+                        <a:t>Programs</a:t>
+                      </a:r>
+                      <a:endParaRPr lang="en-US" dirty="0"/>
+                    </a:p>
+                  </a:txBody>
+                  <a:tcPr/>
+                </a:tc>
+                <a:tc hMerge="1">
+                  <a:txBody>
+                    <a:bodyPr/>
+                    <a:lstStyle/>
+                    <a:p>
+                      <a:pPr algn="ctr"/>
+                      <a:endParaRPr lang="en-US" dirty="0"/>
+                    </a:p>
+                  </a:txBody>
+                  <a:tcPr/>
+                </a:tc>
+                <a:tc>
+                  <a:txBody>
+                    <a:bodyPr/>
+                    <a:lstStyle/>
+                    <a:p>
+                      <a:pPr algn="ctr"/>
+                      <a:r>
+                        <a:rPr lang="en-US" dirty="0" smtClean="0"/>
+                        <a:t>‘14-’15</a:t>
+                      </a:r>
+                      <a:endParaRPr lang="en-US" dirty="0"/>
+                    </a:p>
+                  </a:txBody>
+                  <a:tcPr/>
+                </a:tc>
+                <a:tc>
+                  <a:txBody>
+                    <a:bodyPr/>
+                    <a:lstStyle/>
+                    <a:p>
+                      <a:pPr marL="0" marR="0" lvl="0" indent="0" algn="ctr" defTabSz="914400" rtl="0" eaLnBrk="1" fontAlgn="auto" latinLnBrk="0" hangingPunct="1">
+                        <a:lnSpc>
+                          <a:spcPct val="100000"/>
+                        </a:lnSpc>
+                        <a:spcBef>
+                          <a:spcPts val="0"/>
+                        </a:spcBef>
+                        <a:spcAft>
+                          <a:spcPts val="0"/>
+                        </a:spcAft>
+                        <a:buClrTx/>
+                        <a:buSzTx/>
+                        <a:buFontTx/>
+                        <a:buNone/>
+                        <a:tabLst/>
+                        <a:defRPr/>
+                      </a:pPr>
+                      <a:r>
+                        <a:rPr lang="en-US" dirty="0" smtClean="0"/>
+                        <a:t>‘15-’16</a:t>
+                      </a:r>
+                    </a:p>
+                  </a:txBody>
+                  <a:tcPr/>
+                </a:tc>
+                <a:tc>
+                  <a:txBody>
+                    <a:bodyPr/>
+                    <a:lstStyle/>
+                    <a:p>
+                      <a:pPr algn="ctr"/>
+                      <a:r>
+                        <a:rPr lang="en-US" dirty="0" smtClean="0"/>
+                        <a:t>‘16-’17</a:t>
+                      </a:r>
+                      <a:endParaRPr lang="en-US" dirty="0"/>
+                    </a:p>
+                  </a:txBody>
+                  <a:tcPr/>
+                </a:tc>
+                <a:tc>
+                  <a:txBody>
+                    <a:bodyPr/>
+                    <a:lstStyle/>
+                    <a:p>
+                      <a:pPr algn="ctr"/>
+                      <a:r>
+                        <a:rPr lang="en-US" dirty="0" smtClean="0"/>
+                        <a:t>‘17-’18</a:t>
+                      </a:r>
+                      <a:endParaRPr lang="en-US" dirty="0"/>
+                    </a:p>
+                  </a:txBody>
+                  <a:tcPr/>
+                </a:tc>
+                <a:tc>
+                  <a:txBody>
+                    <a:bodyPr/>
+                    <a:lstStyle/>
+                    <a:p>
+                      <a:pPr algn="ctr"/>
+                      <a:r>
+                        <a:rPr lang="en-US" dirty="0" smtClean="0"/>
+                        <a:t>‘18-’19</a:t>
+                      </a:r>
+                      <a:endParaRPr lang="en-US" dirty="0"/>
+                    </a:p>
+                  </a:txBody>
+                  <a:tcPr/>
+                </a:tc>
+                <a:tc>
+                  <a:txBody>
+                    <a:bodyPr/>
+                    <a:lstStyle/>
+                    <a:p>
+                      <a:pPr algn="ctr"/>
+                      <a:r>
+                        <a:rPr lang="en-US" dirty="0" smtClean="0"/>
+                        <a:t>Total</a:t>
+                      </a:r>
+                      <a:endParaRPr lang="en-US" dirty="0"/>
+                    </a:p>
+                  </a:txBody>
+                  <a:tcPr/>
+                </a:tc>
+                <a:extLst>
+                  <a:ext uri="{0D108BD9-81ED-4DB2-BD59-A6C34878D82A}">
+                    <a16:rowId xmlns:a16="http://schemas.microsoft.com/office/drawing/2014/main" val="3862111645"/>
+                  </a:ext>
+                </a:extLst>
+              </a:tr>
+              <a:tr h="370840">
+                <a:tc rowSpan="2">
+                  <a:txBody>
+                    <a:bodyPr/>
+                    <a:lstStyle/>
+                    <a:p>
+                      <a:r>
+                        <a:rPr lang="en-US" sz="1800" dirty="0" smtClean="0"/>
+                        <a:t>DSCI</a:t>
+                      </a:r>
+                      <a:endParaRPr lang="en-US" sz="1800" dirty="0"/>
+                    </a:p>
+                  </a:txBody>
+                  <a:tcPr/>
+                </a:tc>
+                <a:tc>
+                  <a:txBody>
+                    <a:bodyPr/>
+                    <a:lstStyle/>
+                    <a:p>
+                      <a:r>
+                        <a:rPr lang="en-US" sz="1800" dirty="0" smtClean="0"/>
+                        <a:t>Majors</a:t>
+                      </a:r>
+                      <a:endParaRPr lang="en-US" sz="1800" dirty="0"/>
+                    </a:p>
+                  </a:txBody>
+                  <a:tcPr/>
+                </a:tc>
+                <a:tc>
+                  <a:txBody>
+                    <a:bodyPr/>
+                    <a:lstStyle/>
+                    <a:p>
+                      <a:pPr algn="ctr"/>
+                      <a:r>
+                        <a:rPr lang="en-US" sz="2000" dirty="0" smtClean="0"/>
+                        <a:t>7</a:t>
+                      </a:r>
+                      <a:endParaRPr lang="en-US" sz="2000" dirty="0"/>
+                    </a:p>
+                  </a:txBody>
+                  <a:tcPr/>
+                </a:tc>
+                <a:tc>
+                  <a:txBody>
+                    <a:bodyPr/>
+                    <a:lstStyle/>
+                    <a:p>
+                      <a:pPr algn="ctr"/>
+                      <a:r>
+                        <a:rPr lang="en-US" sz="2000" dirty="0" smtClean="0"/>
+                        <a:t>5</a:t>
+                      </a:r>
+                      <a:endParaRPr lang="en-US" sz="2000" dirty="0"/>
+                    </a:p>
+                  </a:txBody>
+                  <a:tcPr/>
+                </a:tc>
+                <a:tc>
+                  <a:txBody>
+                    <a:bodyPr/>
+                    <a:lstStyle/>
+                    <a:p>
+                      <a:pPr algn="ctr"/>
+                      <a:r>
+                        <a:rPr lang="en-US" sz="2000" dirty="0" smtClean="0"/>
+                        <a:t>24</a:t>
+                      </a:r>
+                      <a:endParaRPr lang="en-US" sz="2000" dirty="0"/>
+                    </a:p>
+                  </a:txBody>
+                  <a:tcPr/>
+                </a:tc>
+                <a:tc>
+                  <a:txBody>
+                    <a:bodyPr/>
+                    <a:lstStyle/>
+                    <a:p>
+                      <a:pPr algn="ctr"/>
+                      <a:r>
+                        <a:rPr lang="en-US" sz="2000" dirty="0" smtClean="0"/>
+                        <a:t>18</a:t>
+                      </a:r>
+                      <a:endParaRPr lang="en-US" sz="2000" dirty="0"/>
+                    </a:p>
+                  </a:txBody>
+                  <a:tcPr/>
+                </a:tc>
+                <a:tc>
+                  <a:txBody>
+                    <a:bodyPr/>
+                    <a:lstStyle/>
+                    <a:p>
+                      <a:pPr algn="ctr"/>
+                      <a:r>
+                        <a:rPr lang="en-US" sz="2000" dirty="0" smtClean="0"/>
+                        <a:t>19</a:t>
+                      </a:r>
+                      <a:endParaRPr lang="en-US" sz="2000" dirty="0"/>
+                    </a:p>
+                  </a:txBody>
+                  <a:tcPr/>
+                </a:tc>
+                <a:tc>
+                  <a:txBody>
+                    <a:bodyPr/>
+                    <a:lstStyle/>
+                    <a:p>
+                      <a:pPr algn="ctr"/>
+                      <a:r>
+                        <a:rPr lang="en-US" sz="2000" dirty="0" smtClean="0"/>
+                        <a:t>73</a:t>
+                      </a:r>
+                      <a:endParaRPr lang="en-US" sz="2000" dirty="0"/>
+                    </a:p>
+                  </a:txBody>
+                  <a:tcPr/>
+                </a:tc>
+                <a:extLst>
+                  <a:ext uri="{0D108BD9-81ED-4DB2-BD59-A6C34878D82A}">
+                    <a16:rowId xmlns:a16="http://schemas.microsoft.com/office/drawing/2014/main" val="2882899412"/>
+                  </a:ext>
+                </a:extLst>
+              </a:tr>
+              <a:tr h="370840">
+                <a:tc vMerge="1">
+                  <a:txBody>
+                    <a:bodyPr/>
+                    <a:lstStyle/>
+                    <a:p>
+                      <a:endParaRPr lang="en-US" sz="1800" dirty="0"/>
+                    </a:p>
+                  </a:txBody>
+                  <a:tcPr/>
+                </a:tc>
+                <a:tc>
+                  <a:txBody>
+                    <a:bodyPr/>
+                    <a:lstStyle/>
+                    <a:p>
+                      <a:endParaRPr lang="en-US" sz="1800" dirty="0"/>
+                    </a:p>
+                  </a:txBody>
+                  <a:tcPr/>
+                </a:tc>
+                <a:tc>
+                  <a:txBody>
+                    <a:bodyPr/>
+                    <a:lstStyle/>
+                    <a:p>
+                      <a:pPr algn="ctr"/>
+                      <a:endParaRPr lang="en-US" sz="2000" dirty="0"/>
+                    </a:p>
+                  </a:txBody>
+                  <a:tcPr/>
+                </a:tc>
+                <a:tc>
+                  <a:txBody>
+                    <a:bodyPr/>
+                    <a:lstStyle/>
+                    <a:p>
+                      <a:pPr algn="ctr"/>
+                      <a:endParaRPr lang="en-US" sz="2000" dirty="0"/>
+                    </a:p>
+                  </a:txBody>
+                  <a:tcPr/>
+                </a:tc>
+                <a:tc>
+                  <a:txBody>
+                    <a:bodyPr/>
+                    <a:lstStyle/>
+                    <a:p>
+                      <a:pPr algn="ctr"/>
+                      <a:endParaRPr lang="en-US" sz="2000" dirty="0"/>
+                    </a:p>
+                  </a:txBody>
+                  <a:tcPr/>
+                </a:tc>
+                <a:tc>
+                  <a:txBody>
+                    <a:bodyPr/>
+                    <a:lstStyle/>
+                    <a:p>
+                      <a:pPr algn="ctr"/>
+                      <a:endParaRPr lang="en-US" sz="2000" dirty="0"/>
+                    </a:p>
+                  </a:txBody>
+                  <a:tcPr/>
+                </a:tc>
+                <a:tc>
+                  <a:txBody>
+                    <a:bodyPr/>
+                    <a:lstStyle/>
+                    <a:p>
+                      <a:pPr algn="ctr"/>
+                      <a:endParaRPr lang="en-US" sz="2000" dirty="0"/>
+                    </a:p>
+                  </a:txBody>
+                  <a:tcPr/>
+                </a:tc>
+                <a:tc>
+                  <a:txBody>
+                    <a:bodyPr/>
+                    <a:lstStyle/>
+                    <a:p>
+                      <a:pPr algn="ctr"/>
+                      <a:endParaRPr lang="en-US" sz="2000" dirty="0"/>
+                    </a:p>
+                  </a:txBody>
+                  <a:tcPr/>
+                </a:tc>
+                <a:extLst>
+                  <a:ext uri="{0D108BD9-81ED-4DB2-BD59-A6C34878D82A}">
+                    <a16:rowId xmlns:a16="http://schemas.microsoft.com/office/drawing/2014/main" val="2231553093"/>
+                  </a:ext>
+                </a:extLst>
+              </a:tr>
+            </a:tbl>
+          </a:graphicData>
+        </a:graphic>
+      </p:graphicFrame>
     </p:spTree>
     <p:extLst>
       <p:ext uri="{BB962C8B-B14F-4D97-AF65-F5344CB8AC3E}">
@@ -3198,6 +4100,1747 @@
 </file>
 
 <file path=ppt/slides/slide3.xml><?xml version="1.0" encoding="utf-8"?>
+<p:sld xmlns:a="http://schemas.openxmlformats.org/drawingml/2006/main" xmlns:r="http://schemas.openxmlformats.org/officeDocument/2006/relationships" xmlns:p="http://schemas.openxmlformats.org/presentationml/2006/main">
+  <p:cSld>
+    <p:spTree>
+      <p:nvGrpSpPr>
+        <p:cNvPr id="1" name=""/>
+        <p:cNvGrpSpPr/>
+        <p:nvPr/>
+      </p:nvGrpSpPr>
+      <p:grpSpPr>
+        <a:xfrm>
+          <a:off x="0" y="0"/>
+          <a:ext cx="0" cy="0"/>
+          <a:chOff x="0" y="0"/>
+          <a:chExt cx="0" cy="0"/>
+        </a:xfrm>
+      </p:grpSpPr>
+      <p:graphicFrame>
+        <p:nvGraphicFramePr>
+          <p:cNvPr id="5" name="Table 4"/>
+          <p:cNvGraphicFramePr>
+            <a:graphicFrameLocks noGrp="1"/>
+          </p:cNvGraphicFramePr>
+          <p:nvPr>
+            <p:extLst>
+              <p:ext uri="{D42A27DB-BD31-4B8C-83A1-F6EECF244321}">
+                <p14:modId xmlns:p14="http://schemas.microsoft.com/office/powerpoint/2010/main" val="3139392247"/>
+              </p:ext>
+            </p:extLst>
+          </p:nvPr>
+        </p:nvGraphicFramePr>
+        <p:xfrm>
+          <a:off x="1094248" y="3837711"/>
+          <a:ext cx="7057734" cy="1432560"/>
+        </p:xfrm>
+        <a:graphic>
+          <a:graphicData uri="http://schemas.openxmlformats.org/drawingml/2006/table">
+            <a:tbl>
+              <a:tblPr firstRow="1" bandRow="1">
+                <a:tableStyleId>{5C22544A-7EE6-4342-B048-85BDC9FD1C3A}</a:tableStyleId>
+              </a:tblPr>
+              <a:tblGrid>
+                <a:gridCol w="751488">
+                  <a:extLst>
+                    <a:ext uri="{9D8B030D-6E8A-4147-A177-3AD203B41FA5}">
+                      <a16:colId xmlns:a16="http://schemas.microsoft.com/office/drawing/2014/main" val="2410909952"/>
+                    </a:ext>
+                  </a:extLst>
+                </a:gridCol>
+                <a:gridCol w="947141">
+                  <a:extLst>
+                    <a:ext uri="{9D8B030D-6E8A-4147-A177-3AD203B41FA5}">
+                      <a16:colId xmlns:a16="http://schemas.microsoft.com/office/drawing/2014/main" val="3698387799"/>
+                    </a:ext>
+                  </a:extLst>
+                </a:gridCol>
+                <a:gridCol w="986049">
+                  <a:extLst>
+                    <a:ext uri="{9D8B030D-6E8A-4147-A177-3AD203B41FA5}">
+                      <a16:colId xmlns:a16="http://schemas.microsoft.com/office/drawing/2014/main" val="553780359"/>
+                    </a:ext>
+                  </a:extLst>
+                </a:gridCol>
+                <a:gridCol w="964204">
+                  <a:extLst>
+                    <a:ext uri="{9D8B030D-6E8A-4147-A177-3AD203B41FA5}">
+                      <a16:colId xmlns:a16="http://schemas.microsoft.com/office/drawing/2014/main" val="3255666325"/>
+                    </a:ext>
+                  </a:extLst>
+                </a:gridCol>
+                <a:gridCol w="972355">
+                  <a:extLst>
+                    <a:ext uri="{9D8B030D-6E8A-4147-A177-3AD203B41FA5}">
+                      <a16:colId xmlns:a16="http://schemas.microsoft.com/office/drawing/2014/main" val="2512516708"/>
+                    </a:ext>
+                  </a:extLst>
+                </a:gridCol>
+                <a:gridCol w="907639">
+                  <a:extLst>
+                    <a:ext uri="{9D8B030D-6E8A-4147-A177-3AD203B41FA5}">
+                      <a16:colId xmlns:a16="http://schemas.microsoft.com/office/drawing/2014/main" val="3751244542"/>
+                    </a:ext>
+                  </a:extLst>
+                </a:gridCol>
+                <a:gridCol w="877322">
+                  <a:extLst>
+                    <a:ext uri="{9D8B030D-6E8A-4147-A177-3AD203B41FA5}">
+                      <a16:colId xmlns:a16="http://schemas.microsoft.com/office/drawing/2014/main" val="4261644473"/>
+                    </a:ext>
+                  </a:extLst>
+                </a:gridCol>
+                <a:gridCol w="651536">
+                  <a:extLst>
+                    <a:ext uri="{9D8B030D-6E8A-4147-A177-3AD203B41FA5}">
+                      <a16:colId xmlns:a16="http://schemas.microsoft.com/office/drawing/2014/main" val="1060861164"/>
+                    </a:ext>
+                  </a:extLst>
+                </a:gridCol>
+              </a:tblGrid>
+              <a:tr h="370840">
+                <a:tc gridSpan="2">
+                  <a:txBody>
+                    <a:bodyPr/>
+                    <a:lstStyle/>
+                    <a:p>
+                      <a:pPr algn="ctr"/>
+                      <a:endParaRPr lang="en-US" dirty="0"/>
+                    </a:p>
+                  </a:txBody>
+                  <a:tcPr>
+                    <a:solidFill>
+                      <a:schemeClr val="bg1"/>
+                    </a:solidFill>
+                  </a:tcPr>
+                </a:tc>
+                <a:tc hMerge="1">
+                  <a:txBody>
+                    <a:bodyPr/>
+                    <a:lstStyle/>
+                    <a:p>
+                      <a:pPr algn="ctr"/>
+                      <a:endParaRPr lang="en-US" dirty="0"/>
+                    </a:p>
+                  </a:txBody>
+                  <a:tcPr/>
+                </a:tc>
+                <a:tc>
+                  <a:txBody>
+                    <a:bodyPr/>
+                    <a:lstStyle/>
+                    <a:p>
+                      <a:pPr algn="ctr"/>
+                      <a:r>
+                        <a:rPr lang="en-US" dirty="0" smtClean="0"/>
+                        <a:t>‘14-’15</a:t>
+                      </a:r>
+                      <a:endParaRPr lang="en-US" dirty="0"/>
+                    </a:p>
+                  </a:txBody>
+                  <a:tcPr>
+                    <a:solidFill>
+                      <a:schemeClr val="bg1"/>
+                    </a:solidFill>
+                  </a:tcPr>
+                </a:tc>
+                <a:tc>
+                  <a:txBody>
+                    <a:bodyPr/>
+                    <a:lstStyle/>
+                    <a:p>
+                      <a:pPr marL="0" marR="0" lvl="0" indent="0" algn="ctr" defTabSz="914400" rtl="0" eaLnBrk="1" fontAlgn="auto" latinLnBrk="0" hangingPunct="1">
+                        <a:lnSpc>
+                          <a:spcPct val="100000"/>
+                        </a:lnSpc>
+                        <a:spcBef>
+                          <a:spcPts val="0"/>
+                        </a:spcBef>
+                        <a:spcAft>
+                          <a:spcPts val="0"/>
+                        </a:spcAft>
+                        <a:buClrTx/>
+                        <a:buSzTx/>
+                        <a:buFontTx/>
+                        <a:buNone/>
+                        <a:tabLst/>
+                        <a:defRPr/>
+                      </a:pPr>
+                      <a:r>
+                        <a:rPr lang="en-US" dirty="0" smtClean="0"/>
+                        <a:t>‘</a:t>
+                      </a:r>
+                      <a:r>
+                        <a:rPr lang="en-US" dirty="0" smtClean="0"/>
+                        <a:t>15-’2416</a:t>
+                      </a:r>
+                      <a:endParaRPr lang="en-US" dirty="0" smtClean="0"/>
+                    </a:p>
+                  </a:txBody>
+                  <a:tcPr>
+                    <a:solidFill>
+                      <a:schemeClr val="bg1"/>
+                    </a:solidFill>
+                  </a:tcPr>
+                </a:tc>
+                <a:tc>
+                  <a:txBody>
+                    <a:bodyPr/>
+                    <a:lstStyle/>
+                    <a:p>
+                      <a:pPr algn="ctr"/>
+                      <a:r>
+                        <a:rPr lang="en-US" dirty="0" smtClean="0"/>
+                        <a:t>‘16-’17</a:t>
+                      </a:r>
+                      <a:endParaRPr lang="en-US" dirty="0"/>
+                    </a:p>
+                  </a:txBody>
+                  <a:tcPr>
+                    <a:solidFill>
+                      <a:schemeClr val="bg1"/>
+                    </a:solidFill>
+                  </a:tcPr>
+                </a:tc>
+                <a:tc>
+                  <a:txBody>
+                    <a:bodyPr/>
+                    <a:lstStyle/>
+                    <a:p>
+                      <a:pPr algn="ctr"/>
+                      <a:r>
+                        <a:rPr lang="en-US" dirty="0" smtClean="0"/>
+                        <a:t>‘17-’18</a:t>
+                      </a:r>
+                      <a:endParaRPr lang="en-US" dirty="0"/>
+                    </a:p>
+                  </a:txBody>
+                  <a:tcPr>
+                    <a:solidFill>
+                      <a:schemeClr val="bg1"/>
+                    </a:solidFill>
+                  </a:tcPr>
+                </a:tc>
+                <a:tc>
+                  <a:txBody>
+                    <a:bodyPr/>
+                    <a:lstStyle/>
+                    <a:p>
+                      <a:pPr algn="ctr"/>
+                      <a:r>
+                        <a:rPr lang="en-US" dirty="0" smtClean="0"/>
+                        <a:t>‘18-’19</a:t>
+                      </a:r>
+                      <a:endParaRPr lang="en-US" dirty="0"/>
+                    </a:p>
+                  </a:txBody>
+                  <a:tcPr>
+                    <a:solidFill>
+                      <a:schemeClr val="bg1"/>
+                    </a:solidFill>
+                  </a:tcPr>
+                </a:tc>
+                <a:tc>
+                  <a:txBody>
+                    <a:bodyPr/>
+                    <a:lstStyle/>
+                    <a:p>
+                      <a:pPr algn="ctr"/>
+                      <a:r>
+                        <a:rPr lang="en-US" dirty="0" smtClean="0"/>
+                        <a:t>Total</a:t>
+                      </a:r>
+                      <a:endParaRPr lang="en-US" dirty="0"/>
+                    </a:p>
+                  </a:txBody>
+                  <a:tcPr>
+                    <a:solidFill>
+                      <a:schemeClr val="bg1"/>
+                    </a:solidFill>
+                  </a:tcPr>
+                </a:tc>
+                <a:extLst>
+                  <a:ext uri="{0D108BD9-81ED-4DB2-BD59-A6C34878D82A}">
+                    <a16:rowId xmlns:a16="http://schemas.microsoft.com/office/drawing/2014/main" val="1267159179"/>
+                  </a:ext>
+                </a:extLst>
+              </a:tr>
+              <a:tr h="370840">
+                <a:tc rowSpan="2">
+                  <a:txBody>
+                    <a:bodyPr/>
+                    <a:lstStyle/>
+                    <a:p>
+                      <a:r>
+                        <a:rPr lang="en-US" sz="1800" dirty="0" smtClean="0"/>
+                        <a:t>STAT</a:t>
+                      </a:r>
+                      <a:endParaRPr lang="en-US" sz="1800" dirty="0"/>
+                    </a:p>
+                  </a:txBody>
+                  <a:tcPr/>
+                </a:tc>
+                <a:tc>
+                  <a:txBody>
+                    <a:bodyPr/>
+                    <a:lstStyle/>
+                    <a:p>
+                      <a:r>
+                        <a:rPr lang="en-US" sz="1800" dirty="0" smtClean="0"/>
+                        <a:t>Majors</a:t>
+                      </a:r>
+                      <a:endParaRPr lang="en-US" sz="1800" dirty="0"/>
+                    </a:p>
+                  </a:txBody>
+                  <a:tcPr/>
+                </a:tc>
+                <a:tc>
+                  <a:txBody>
+                    <a:bodyPr/>
+                    <a:lstStyle/>
+                    <a:p>
+                      <a:pPr algn="ctr"/>
+                      <a:r>
+                        <a:rPr lang="en-US" sz="2000" dirty="0" smtClean="0"/>
+                        <a:t>12</a:t>
+                      </a:r>
+                      <a:endParaRPr lang="en-US" sz="2000" dirty="0"/>
+                    </a:p>
+                  </a:txBody>
+                  <a:tcPr/>
+                </a:tc>
+                <a:tc>
+                  <a:txBody>
+                    <a:bodyPr/>
+                    <a:lstStyle/>
+                    <a:p>
+                      <a:pPr algn="ctr"/>
+                      <a:r>
+                        <a:rPr lang="en-US" sz="2000" dirty="0" smtClean="0"/>
+                        <a:t>12</a:t>
+                      </a:r>
+                      <a:endParaRPr lang="en-US" sz="2000" dirty="0"/>
+                    </a:p>
+                  </a:txBody>
+                  <a:tcPr/>
+                </a:tc>
+                <a:tc>
+                  <a:txBody>
+                    <a:bodyPr/>
+                    <a:lstStyle/>
+                    <a:p>
+                      <a:pPr algn="ctr"/>
+                      <a:r>
+                        <a:rPr lang="en-US" sz="2000" dirty="0" smtClean="0"/>
+                        <a:t>8</a:t>
+                      </a:r>
+                      <a:endParaRPr lang="en-US" sz="2000" dirty="0"/>
+                    </a:p>
+                  </a:txBody>
+                  <a:tcPr/>
+                </a:tc>
+                <a:tc>
+                  <a:txBody>
+                    <a:bodyPr/>
+                    <a:lstStyle/>
+                    <a:p>
+                      <a:pPr algn="ctr"/>
+                      <a:r>
+                        <a:rPr lang="en-US" sz="2000" dirty="0" smtClean="0"/>
+                        <a:t>15</a:t>
+                      </a:r>
+                      <a:endParaRPr lang="en-US" sz="2000" dirty="0"/>
+                    </a:p>
+                  </a:txBody>
+                  <a:tcPr/>
+                </a:tc>
+                <a:tc>
+                  <a:txBody>
+                    <a:bodyPr/>
+                    <a:lstStyle/>
+                    <a:p>
+                      <a:pPr algn="ctr"/>
+                      <a:r>
+                        <a:rPr lang="en-US" sz="2000" dirty="0" smtClean="0"/>
+                        <a:t>14</a:t>
+                      </a:r>
+                      <a:endParaRPr lang="en-US" sz="2000" dirty="0"/>
+                    </a:p>
+                  </a:txBody>
+                  <a:tcPr/>
+                </a:tc>
+                <a:tc>
+                  <a:txBody>
+                    <a:bodyPr/>
+                    <a:lstStyle/>
+                    <a:p>
+                      <a:pPr algn="ctr"/>
+                      <a:r>
+                        <a:rPr lang="en-US" sz="2000" dirty="0" smtClean="0"/>
+                        <a:t>61</a:t>
+                      </a:r>
+                      <a:endParaRPr lang="en-US" sz="2000" dirty="0"/>
+                    </a:p>
+                  </a:txBody>
+                  <a:tcPr/>
+                </a:tc>
+                <a:extLst>
+                  <a:ext uri="{0D108BD9-81ED-4DB2-BD59-A6C34878D82A}">
+                    <a16:rowId xmlns:a16="http://schemas.microsoft.com/office/drawing/2014/main" val="3233485116"/>
+                  </a:ext>
+                </a:extLst>
+              </a:tr>
+              <a:tr h="370840">
+                <a:tc vMerge="1">
+                  <a:txBody>
+                    <a:bodyPr/>
+                    <a:lstStyle/>
+                    <a:p>
+                      <a:endParaRPr lang="en-US" sz="1800" dirty="0"/>
+                    </a:p>
+                  </a:txBody>
+                  <a:tcPr/>
+                </a:tc>
+                <a:tc>
+                  <a:txBody>
+                    <a:bodyPr/>
+                    <a:lstStyle/>
+                    <a:p>
+                      <a:r>
+                        <a:rPr lang="en-US" sz="1800" dirty="0" smtClean="0"/>
+                        <a:t>Minors</a:t>
+                      </a:r>
+                      <a:endParaRPr lang="en-US" sz="1800" dirty="0"/>
+                    </a:p>
+                  </a:txBody>
+                  <a:tcPr/>
+                </a:tc>
+                <a:tc>
+                  <a:txBody>
+                    <a:bodyPr/>
+                    <a:lstStyle/>
+                    <a:p>
+                      <a:pPr algn="ctr"/>
+                      <a:r>
+                        <a:rPr lang="en-US" sz="2000" dirty="0" smtClean="0"/>
+                        <a:t>13</a:t>
+                      </a:r>
+                      <a:endParaRPr lang="en-US" sz="2000" dirty="0"/>
+                    </a:p>
+                  </a:txBody>
+                  <a:tcPr/>
+                </a:tc>
+                <a:tc>
+                  <a:txBody>
+                    <a:bodyPr/>
+                    <a:lstStyle/>
+                    <a:p>
+                      <a:pPr algn="ctr"/>
+                      <a:r>
+                        <a:rPr lang="en-US" sz="2000" dirty="0" smtClean="0"/>
+                        <a:t>24</a:t>
+                      </a:r>
+                      <a:endParaRPr lang="en-US" sz="2000" dirty="0"/>
+                    </a:p>
+                  </a:txBody>
+                  <a:tcPr/>
+                </a:tc>
+                <a:tc>
+                  <a:txBody>
+                    <a:bodyPr/>
+                    <a:lstStyle/>
+                    <a:p>
+                      <a:pPr algn="ctr"/>
+                      <a:r>
+                        <a:rPr lang="en-US" sz="2000" dirty="0" smtClean="0"/>
+                        <a:t>31</a:t>
+                      </a:r>
+                      <a:endParaRPr lang="en-US" sz="2000" dirty="0"/>
+                    </a:p>
+                  </a:txBody>
+                  <a:tcPr/>
+                </a:tc>
+                <a:tc>
+                  <a:txBody>
+                    <a:bodyPr/>
+                    <a:lstStyle/>
+                    <a:p>
+                      <a:pPr algn="ctr"/>
+                      <a:r>
+                        <a:rPr lang="en-US" sz="2000" dirty="0" smtClean="0"/>
+                        <a:t>30</a:t>
+                      </a:r>
+                      <a:endParaRPr lang="en-US" sz="2000" dirty="0"/>
+                    </a:p>
+                  </a:txBody>
+                  <a:tcPr/>
+                </a:tc>
+                <a:tc>
+                  <a:txBody>
+                    <a:bodyPr/>
+                    <a:lstStyle/>
+                    <a:p>
+                      <a:pPr algn="ctr"/>
+                      <a:r>
+                        <a:rPr lang="en-US" sz="2000" dirty="0" smtClean="0"/>
+                        <a:t>23</a:t>
+                      </a:r>
+                      <a:endParaRPr lang="en-US" sz="2000" dirty="0"/>
+                    </a:p>
+                  </a:txBody>
+                  <a:tcPr/>
+                </a:tc>
+                <a:tc>
+                  <a:txBody>
+                    <a:bodyPr/>
+                    <a:lstStyle/>
+                    <a:p>
+                      <a:pPr algn="ctr"/>
+                      <a:r>
+                        <a:rPr lang="en-US" sz="2000" dirty="0" smtClean="0"/>
+                        <a:t>121</a:t>
+                      </a:r>
+                      <a:endParaRPr lang="en-US" sz="2000" dirty="0"/>
+                    </a:p>
+                  </a:txBody>
+                  <a:tcPr/>
+                </a:tc>
+                <a:extLst>
+                  <a:ext uri="{0D108BD9-81ED-4DB2-BD59-A6C34878D82A}">
+                    <a16:rowId xmlns:a16="http://schemas.microsoft.com/office/drawing/2014/main" val="1702215844"/>
+                  </a:ext>
+                </a:extLst>
+              </a:tr>
+            </a:tbl>
+          </a:graphicData>
+        </a:graphic>
+      </p:graphicFrame>
+      <p:sp>
+        <p:nvSpPr>
+          <p:cNvPr id="2" name="Title 1">
+            <a:extLst>
+              <a:ext uri="{FF2B5EF4-FFF2-40B4-BE49-F238E27FC236}">
+                <a16:creationId xmlns:a16="http://schemas.microsoft.com/office/drawing/2014/main" id="{5FC12995-239A-0143-8905-3A0BA23BBC2E}"/>
+              </a:ext>
+            </a:extLst>
+          </p:cNvPr>
+          <p:cNvSpPr>
+            <a:spLocks noGrp="1"/>
+          </p:cNvSpPr>
+          <p:nvPr>
+            <p:ph type="title"/>
+          </p:nvPr>
+        </p:nvSpPr>
+        <p:spPr/>
+        <p:txBody>
+          <a:bodyPr/>
+          <a:lstStyle/>
+          <a:p>
+            <a:r>
+              <a:rPr lang="en-US" dirty="0"/>
+              <a:t>Data Science at WSU</a:t>
+            </a:r>
+            <a:br>
+              <a:rPr lang="en-US" dirty="0"/>
+            </a:br>
+            <a:r>
+              <a:rPr lang="en-US" sz="3200" dirty="0" smtClean="0"/>
+              <a:t>A Little </a:t>
+            </a:r>
+            <a:r>
+              <a:rPr lang="en-US" sz="3200" dirty="0"/>
+              <a:t>History</a:t>
+            </a:r>
+          </a:p>
+        </p:txBody>
+      </p:sp>
+      <p:sp>
+        <p:nvSpPr>
+          <p:cNvPr id="3" name="Content Placeholder 2">
+            <a:extLst>
+              <a:ext uri="{FF2B5EF4-FFF2-40B4-BE49-F238E27FC236}">
+                <a16:creationId xmlns:a16="http://schemas.microsoft.com/office/drawing/2014/main" id="{3722BA8A-017E-184B-AD0F-CA71D6B3889A}"/>
+              </a:ext>
+            </a:extLst>
+          </p:cNvPr>
+          <p:cNvSpPr>
+            <a:spLocks noGrp="1"/>
+          </p:cNvSpPr>
+          <p:nvPr>
+            <p:ph idx="1"/>
+          </p:nvPr>
+        </p:nvSpPr>
+        <p:spPr/>
+        <p:txBody>
+          <a:bodyPr>
+            <a:normAutofit/>
+          </a:bodyPr>
+          <a:lstStyle/>
+          <a:p>
+            <a:r>
+              <a:rPr lang="en-US" dirty="0"/>
+              <a:t>Started </a:t>
+            </a:r>
+            <a:r>
+              <a:rPr lang="en-US" dirty="0" smtClean="0"/>
+              <a:t>Fall 2014</a:t>
+            </a:r>
+            <a:endParaRPr lang="en-US" dirty="0"/>
+          </a:p>
+          <a:p>
+            <a:r>
+              <a:rPr lang="en-US" dirty="0" smtClean="0"/>
+              <a:t>Program Growth</a:t>
+            </a:r>
+          </a:p>
+          <a:p>
+            <a:pPr marL="0" indent="0">
+              <a:buNone/>
+            </a:pPr>
+            <a:endParaRPr lang="en-US" dirty="0"/>
+          </a:p>
+          <a:p>
+            <a:pPr marL="457200" lvl="1" indent="0">
+              <a:buNone/>
+            </a:pPr>
+            <a:endParaRPr lang="en-US" dirty="0"/>
+          </a:p>
+          <a:p>
+            <a:pPr marL="0" indent="0">
+              <a:buNone/>
+            </a:pPr>
+            <a:endParaRPr lang="en-US" dirty="0" smtClean="0"/>
+          </a:p>
+        </p:txBody>
+      </p:sp>
+      <p:graphicFrame>
+        <p:nvGraphicFramePr>
+          <p:cNvPr id="4" name="Table 3"/>
+          <p:cNvGraphicFramePr>
+            <a:graphicFrameLocks noGrp="1"/>
+          </p:cNvGraphicFramePr>
+          <p:nvPr>
+            <p:extLst>
+              <p:ext uri="{D42A27DB-BD31-4B8C-83A1-F6EECF244321}">
+                <p14:modId xmlns:p14="http://schemas.microsoft.com/office/powerpoint/2010/main" val="2334508488"/>
+              </p:ext>
+            </p:extLst>
+          </p:nvPr>
+        </p:nvGraphicFramePr>
+        <p:xfrm>
+          <a:off x="1094248" y="3043898"/>
+          <a:ext cx="7057734" cy="1163320"/>
+        </p:xfrm>
+        <a:graphic>
+          <a:graphicData uri="http://schemas.openxmlformats.org/drawingml/2006/table">
+            <a:tbl>
+              <a:tblPr firstRow="1" bandRow="1">
+                <a:tableStyleId>{5C22544A-7EE6-4342-B048-85BDC9FD1C3A}</a:tableStyleId>
+              </a:tblPr>
+              <a:tblGrid>
+                <a:gridCol w="751488">
+                  <a:extLst>
+                    <a:ext uri="{9D8B030D-6E8A-4147-A177-3AD203B41FA5}">
+                      <a16:colId xmlns:a16="http://schemas.microsoft.com/office/drawing/2014/main" val="3277107595"/>
+                    </a:ext>
+                  </a:extLst>
+                </a:gridCol>
+                <a:gridCol w="947141">
+                  <a:extLst>
+                    <a:ext uri="{9D8B030D-6E8A-4147-A177-3AD203B41FA5}">
+                      <a16:colId xmlns:a16="http://schemas.microsoft.com/office/drawing/2014/main" val="109790636"/>
+                    </a:ext>
+                  </a:extLst>
+                </a:gridCol>
+                <a:gridCol w="986049">
+                  <a:extLst>
+                    <a:ext uri="{9D8B030D-6E8A-4147-A177-3AD203B41FA5}">
+                      <a16:colId xmlns:a16="http://schemas.microsoft.com/office/drawing/2014/main" val="2977520167"/>
+                    </a:ext>
+                  </a:extLst>
+                </a:gridCol>
+                <a:gridCol w="964204">
+                  <a:extLst>
+                    <a:ext uri="{9D8B030D-6E8A-4147-A177-3AD203B41FA5}">
+                      <a16:colId xmlns:a16="http://schemas.microsoft.com/office/drawing/2014/main" val="4099176073"/>
+                    </a:ext>
+                  </a:extLst>
+                </a:gridCol>
+                <a:gridCol w="972355">
+                  <a:extLst>
+                    <a:ext uri="{9D8B030D-6E8A-4147-A177-3AD203B41FA5}">
+                      <a16:colId xmlns:a16="http://schemas.microsoft.com/office/drawing/2014/main" val="2459809661"/>
+                    </a:ext>
+                  </a:extLst>
+                </a:gridCol>
+                <a:gridCol w="907639">
+                  <a:extLst>
+                    <a:ext uri="{9D8B030D-6E8A-4147-A177-3AD203B41FA5}">
+                      <a16:colId xmlns:a16="http://schemas.microsoft.com/office/drawing/2014/main" val="1637044074"/>
+                    </a:ext>
+                  </a:extLst>
+                </a:gridCol>
+                <a:gridCol w="877322">
+                  <a:extLst>
+                    <a:ext uri="{9D8B030D-6E8A-4147-A177-3AD203B41FA5}">
+                      <a16:colId xmlns:a16="http://schemas.microsoft.com/office/drawing/2014/main" val="1376920956"/>
+                    </a:ext>
+                  </a:extLst>
+                </a:gridCol>
+                <a:gridCol w="651536">
+                  <a:extLst>
+                    <a:ext uri="{9D8B030D-6E8A-4147-A177-3AD203B41FA5}">
+                      <a16:colId xmlns:a16="http://schemas.microsoft.com/office/drawing/2014/main" val="2037266424"/>
+                    </a:ext>
+                  </a:extLst>
+                </a:gridCol>
+              </a:tblGrid>
+              <a:tr h="370840">
+                <a:tc gridSpan="2">
+                  <a:txBody>
+                    <a:bodyPr/>
+                    <a:lstStyle/>
+                    <a:p>
+                      <a:pPr algn="ctr"/>
+                      <a:r>
+                        <a:rPr lang="en-US" dirty="0" smtClean="0"/>
+                        <a:t>Programs</a:t>
+                      </a:r>
+                      <a:endParaRPr lang="en-US" dirty="0"/>
+                    </a:p>
+                  </a:txBody>
+                  <a:tcPr/>
+                </a:tc>
+                <a:tc hMerge="1">
+                  <a:txBody>
+                    <a:bodyPr/>
+                    <a:lstStyle/>
+                    <a:p>
+                      <a:pPr algn="ctr"/>
+                      <a:endParaRPr lang="en-US" dirty="0"/>
+                    </a:p>
+                  </a:txBody>
+                  <a:tcPr/>
+                </a:tc>
+                <a:tc>
+                  <a:txBody>
+                    <a:bodyPr/>
+                    <a:lstStyle/>
+                    <a:p>
+                      <a:pPr algn="ctr"/>
+                      <a:r>
+                        <a:rPr lang="en-US" dirty="0" smtClean="0"/>
+                        <a:t>‘14-’15</a:t>
+                      </a:r>
+                      <a:endParaRPr lang="en-US" dirty="0"/>
+                    </a:p>
+                  </a:txBody>
+                  <a:tcPr/>
+                </a:tc>
+                <a:tc>
+                  <a:txBody>
+                    <a:bodyPr/>
+                    <a:lstStyle/>
+                    <a:p>
+                      <a:pPr marL="0" marR="0" lvl="0" indent="0" algn="ctr" defTabSz="914400" rtl="0" eaLnBrk="1" fontAlgn="auto" latinLnBrk="0" hangingPunct="1">
+                        <a:lnSpc>
+                          <a:spcPct val="100000"/>
+                        </a:lnSpc>
+                        <a:spcBef>
+                          <a:spcPts val="0"/>
+                        </a:spcBef>
+                        <a:spcAft>
+                          <a:spcPts val="0"/>
+                        </a:spcAft>
+                        <a:buClrTx/>
+                        <a:buSzTx/>
+                        <a:buFontTx/>
+                        <a:buNone/>
+                        <a:tabLst/>
+                        <a:defRPr/>
+                      </a:pPr>
+                      <a:r>
+                        <a:rPr lang="en-US" dirty="0" smtClean="0"/>
+                        <a:t>‘15-’16</a:t>
+                      </a:r>
+                    </a:p>
+                  </a:txBody>
+                  <a:tcPr/>
+                </a:tc>
+                <a:tc>
+                  <a:txBody>
+                    <a:bodyPr/>
+                    <a:lstStyle/>
+                    <a:p>
+                      <a:pPr algn="ctr"/>
+                      <a:r>
+                        <a:rPr lang="en-US" dirty="0" smtClean="0"/>
+                        <a:t>‘16-’17</a:t>
+                      </a:r>
+                      <a:endParaRPr lang="en-US" dirty="0"/>
+                    </a:p>
+                  </a:txBody>
+                  <a:tcPr/>
+                </a:tc>
+                <a:tc>
+                  <a:txBody>
+                    <a:bodyPr/>
+                    <a:lstStyle/>
+                    <a:p>
+                      <a:pPr algn="ctr"/>
+                      <a:r>
+                        <a:rPr lang="en-US" dirty="0" smtClean="0"/>
+                        <a:t>‘17-’18</a:t>
+                      </a:r>
+                      <a:endParaRPr lang="en-US" dirty="0"/>
+                    </a:p>
+                  </a:txBody>
+                  <a:tcPr/>
+                </a:tc>
+                <a:tc>
+                  <a:txBody>
+                    <a:bodyPr/>
+                    <a:lstStyle/>
+                    <a:p>
+                      <a:pPr algn="ctr"/>
+                      <a:r>
+                        <a:rPr lang="en-US" dirty="0" smtClean="0"/>
+                        <a:t>‘18-’19</a:t>
+                      </a:r>
+                      <a:endParaRPr lang="en-US" dirty="0"/>
+                    </a:p>
+                  </a:txBody>
+                  <a:tcPr/>
+                </a:tc>
+                <a:tc>
+                  <a:txBody>
+                    <a:bodyPr/>
+                    <a:lstStyle/>
+                    <a:p>
+                      <a:pPr algn="ctr"/>
+                      <a:r>
+                        <a:rPr lang="en-US" dirty="0" smtClean="0"/>
+                        <a:t>Total</a:t>
+                      </a:r>
+                      <a:endParaRPr lang="en-US" dirty="0"/>
+                    </a:p>
+                  </a:txBody>
+                  <a:tcPr/>
+                </a:tc>
+                <a:extLst>
+                  <a:ext uri="{0D108BD9-81ED-4DB2-BD59-A6C34878D82A}">
+                    <a16:rowId xmlns:a16="http://schemas.microsoft.com/office/drawing/2014/main" val="3862111645"/>
+                  </a:ext>
+                </a:extLst>
+              </a:tr>
+              <a:tr h="370840">
+                <a:tc rowSpan="2">
+                  <a:txBody>
+                    <a:bodyPr/>
+                    <a:lstStyle/>
+                    <a:p>
+                      <a:r>
+                        <a:rPr lang="en-US" sz="1800" dirty="0" smtClean="0"/>
+                        <a:t>DSCI</a:t>
+                      </a:r>
+                      <a:endParaRPr lang="en-US" sz="1800" dirty="0"/>
+                    </a:p>
+                  </a:txBody>
+                  <a:tcPr/>
+                </a:tc>
+                <a:tc>
+                  <a:txBody>
+                    <a:bodyPr/>
+                    <a:lstStyle/>
+                    <a:p>
+                      <a:r>
+                        <a:rPr lang="en-US" sz="1800" dirty="0" smtClean="0">
+                          <a:solidFill>
+                            <a:schemeClr val="tx1"/>
+                          </a:solidFill>
+                        </a:rPr>
+                        <a:t>Majors</a:t>
+                      </a:r>
+                      <a:endParaRPr lang="en-US" sz="1800" dirty="0">
+                        <a:solidFill>
+                          <a:schemeClr val="tx1"/>
+                        </a:solidFill>
+                      </a:endParaRPr>
+                    </a:p>
+                  </a:txBody>
+                  <a:tcPr/>
+                </a:tc>
+                <a:tc>
+                  <a:txBody>
+                    <a:bodyPr/>
+                    <a:lstStyle/>
+                    <a:p>
+                      <a:pPr algn="ctr"/>
+                      <a:r>
+                        <a:rPr lang="en-US" sz="2000" dirty="0" smtClean="0">
+                          <a:solidFill>
+                            <a:schemeClr val="tx1"/>
+                          </a:solidFill>
+                        </a:rPr>
+                        <a:t>7</a:t>
+                      </a:r>
+                      <a:endParaRPr lang="en-US" sz="2000" dirty="0">
+                        <a:solidFill>
+                          <a:schemeClr val="tx1"/>
+                        </a:solidFill>
+                      </a:endParaRPr>
+                    </a:p>
+                  </a:txBody>
+                  <a:tcPr/>
+                </a:tc>
+                <a:tc>
+                  <a:txBody>
+                    <a:bodyPr/>
+                    <a:lstStyle/>
+                    <a:p>
+                      <a:pPr algn="ctr"/>
+                      <a:r>
+                        <a:rPr lang="en-US" sz="2000" dirty="0" smtClean="0">
+                          <a:solidFill>
+                            <a:schemeClr val="tx1"/>
+                          </a:solidFill>
+                        </a:rPr>
+                        <a:t>5</a:t>
+                      </a:r>
+                      <a:endParaRPr lang="en-US" sz="2000" dirty="0">
+                        <a:solidFill>
+                          <a:schemeClr val="tx1"/>
+                        </a:solidFill>
+                      </a:endParaRPr>
+                    </a:p>
+                  </a:txBody>
+                  <a:tcPr/>
+                </a:tc>
+                <a:tc>
+                  <a:txBody>
+                    <a:bodyPr/>
+                    <a:lstStyle/>
+                    <a:p>
+                      <a:pPr algn="ctr"/>
+                      <a:r>
+                        <a:rPr lang="en-US" sz="2000" dirty="0" smtClean="0">
+                          <a:solidFill>
+                            <a:schemeClr val="tx1"/>
+                          </a:solidFill>
+                        </a:rPr>
+                        <a:t>24</a:t>
+                      </a:r>
+                      <a:endParaRPr lang="en-US" sz="2000" dirty="0">
+                        <a:solidFill>
+                          <a:schemeClr val="tx1"/>
+                        </a:solidFill>
+                      </a:endParaRPr>
+                    </a:p>
+                  </a:txBody>
+                  <a:tcPr/>
+                </a:tc>
+                <a:tc>
+                  <a:txBody>
+                    <a:bodyPr/>
+                    <a:lstStyle/>
+                    <a:p>
+                      <a:pPr algn="ctr"/>
+                      <a:r>
+                        <a:rPr lang="en-US" sz="2000" dirty="0" smtClean="0">
+                          <a:solidFill>
+                            <a:schemeClr val="tx1"/>
+                          </a:solidFill>
+                        </a:rPr>
+                        <a:t>18</a:t>
+                      </a:r>
+                      <a:endParaRPr lang="en-US" sz="2000" dirty="0">
+                        <a:solidFill>
+                          <a:schemeClr val="tx1"/>
+                        </a:solidFill>
+                      </a:endParaRPr>
+                    </a:p>
+                  </a:txBody>
+                  <a:tcPr/>
+                </a:tc>
+                <a:tc>
+                  <a:txBody>
+                    <a:bodyPr/>
+                    <a:lstStyle/>
+                    <a:p>
+                      <a:pPr algn="ctr"/>
+                      <a:r>
+                        <a:rPr lang="en-US" sz="2000" dirty="0" smtClean="0">
+                          <a:solidFill>
+                            <a:schemeClr val="tx1"/>
+                          </a:solidFill>
+                        </a:rPr>
+                        <a:t>19</a:t>
+                      </a:r>
+                      <a:endParaRPr lang="en-US" sz="2000" dirty="0">
+                        <a:solidFill>
+                          <a:schemeClr val="tx1"/>
+                        </a:solidFill>
+                      </a:endParaRPr>
+                    </a:p>
+                  </a:txBody>
+                  <a:tcPr/>
+                </a:tc>
+                <a:tc>
+                  <a:txBody>
+                    <a:bodyPr/>
+                    <a:lstStyle/>
+                    <a:p>
+                      <a:pPr algn="ctr"/>
+                      <a:r>
+                        <a:rPr lang="en-US" sz="2000" dirty="0" smtClean="0">
+                          <a:solidFill>
+                            <a:schemeClr val="tx1"/>
+                          </a:solidFill>
+                        </a:rPr>
+                        <a:t>73</a:t>
+                      </a:r>
+                      <a:endParaRPr lang="en-US" sz="2000" dirty="0">
+                        <a:solidFill>
+                          <a:schemeClr val="tx1"/>
+                        </a:solidFill>
+                      </a:endParaRPr>
+                    </a:p>
+                  </a:txBody>
+                  <a:tcPr/>
+                </a:tc>
+                <a:extLst>
+                  <a:ext uri="{0D108BD9-81ED-4DB2-BD59-A6C34878D82A}">
+                    <a16:rowId xmlns:a16="http://schemas.microsoft.com/office/drawing/2014/main" val="2882899412"/>
+                  </a:ext>
+                </a:extLst>
+              </a:tr>
+              <a:tr h="370840">
+                <a:tc vMerge="1">
+                  <a:txBody>
+                    <a:bodyPr/>
+                    <a:lstStyle/>
+                    <a:p>
+                      <a:endParaRPr lang="en-US" sz="1800" dirty="0"/>
+                    </a:p>
+                  </a:txBody>
+                  <a:tcPr/>
+                </a:tc>
+                <a:tc>
+                  <a:txBody>
+                    <a:bodyPr/>
+                    <a:lstStyle/>
+                    <a:p>
+                      <a:r>
+                        <a:rPr lang="en-US" sz="1800" dirty="0" smtClean="0"/>
+                        <a:t>Minors</a:t>
+                      </a:r>
+                      <a:endParaRPr lang="en-US" sz="1800" dirty="0"/>
+                    </a:p>
+                  </a:txBody>
+                  <a:tcPr/>
+                </a:tc>
+                <a:tc>
+                  <a:txBody>
+                    <a:bodyPr/>
+                    <a:lstStyle/>
+                    <a:p>
+                      <a:pPr algn="ctr"/>
+                      <a:r>
+                        <a:rPr lang="en-US" sz="2000" dirty="0" smtClean="0"/>
+                        <a:t>8</a:t>
+                      </a:r>
+                      <a:endParaRPr lang="en-US" sz="2000" dirty="0"/>
+                    </a:p>
+                  </a:txBody>
+                  <a:tcPr/>
+                </a:tc>
+                <a:tc>
+                  <a:txBody>
+                    <a:bodyPr/>
+                    <a:lstStyle/>
+                    <a:p>
+                      <a:pPr algn="ctr"/>
+                      <a:r>
+                        <a:rPr lang="en-US" sz="2000" dirty="0" smtClean="0"/>
+                        <a:t>12</a:t>
+                      </a:r>
+                      <a:endParaRPr lang="en-US" sz="2000" dirty="0"/>
+                    </a:p>
+                  </a:txBody>
+                  <a:tcPr/>
+                </a:tc>
+                <a:tc>
+                  <a:txBody>
+                    <a:bodyPr/>
+                    <a:lstStyle/>
+                    <a:p>
+                      <a:pPr algn="ctr"/>
+                      <a:r>
+                        <a:rPr lang="en-US" sz="2000" dirty="0" smtClean="0"/>
+                        <a:t>13</a:t>
+                      </a:r>
+                      <a:endParaRPr lang="en-US" sz="2000" dirty="0"/>
+                    </a:p>
+                  </a:txBody>
+                  <a:tcPr/>
+                </a:tc>
+                <a:tc>
+                  <a:txBody>
+                    <a:bodyPr/>
+                    <a:lstStyle/>
+                    <a:p>
+                      <a:pPr algn="ctr"/>
+                      <a:r>
+                        <a:rPr lang="en-US" sz="2000" dirty="0" smtClean="0"/>
+                        <a:t>17</a:t>
+                      </a:r>
+                      <a:endParaRPr lang="en-US" sz="2000" dirty="0"/>
+                    </a:p>
+                  </a:txBody>
+                  <a:tcPr/>
+                </a:tc>
+                <a:tc>
+                  <a:txBody>
+                    <a:bodyPr/>
+                    <a:lstStyle/>
+                    <a:p>
+                      <a:pPr algn="ctr"/>
+                      <a:r>
+                        <a:rPr lang="en-US" sz="2000" dirty="0" smtClean="0"/>
+                        <a:t>16</a:t>
+                      </a:r>
+                      <a:endParaRPr lang="en-US" sz="2000" dirty="0"/>
+                    </a:p>
+                  </a:txBody>
+                  <a:tcPr/>
+                </a:tc>
+                <a:tc>
+                  <a:txBody>
+                    <a:bodyPr/>
+                    <a:lstStyle/>
+                    <a:p>
+                      <a:pPr algn="ctr"/>
+                      <a:r>
+                        <a:rPr lang="en-US" sz="2000" dirty="0" smtClean="0"/>
+                        <a:t>66</a:t>
+                      </a:r>
+                      <a:endParaRPr lang="en-US" sz="2000" dirty="0"/>
+                    </a:p>
+                  </a:txBody>
+                  <a:tcPr/>
+                </a:tc>
+                <a:extLst>
+                  <a:ext uri="{0D108BD9-81ED-4DB2-BD59-A6C34878D82A}">
+                    <a16:rowId xmlns:a16="http://schemas.microsoft.com/office/drawing/2014/main" val="2231553093"/>
+                  </a:ext>
+                </a:extLst>
+              </a:tr>
+            </a:tbl>
+          </a:graphicData>
+        </a:graphic>
+      </p:graphicFrame>
+      <p:sp>
+        <p:nvSpPr>
+          <p:cNvPr id="6" name="TextBox 5"/>
+          <p:cNvSpPr txBox="1"/>
+          <p:nvPr/>
+        </p:nvSpPr>
+        <p:spPr>
+          <a:xfrm>
+            <a:off x="1094248" y="5585792"/>
+            <a:ext cx="7115474" cy="584775"/>
+          </a:xfrm>
+          <a:prstGeom prst="rect">
+            <a:avLst/>
+          </a:prstGeom>
+          <a:noFill/>
+        </p:spPr>
+        <p:txBody>
+          <a:bodyPr wrap="square" rtlCol="0">
+            <a:spAutoFit/>
+          </a:bodyPr>
+          <a:lstStyle/>
+          <a:p>
+            <a:pPr algn="ctr"/>
+            <a:r>
+              <a:rPr lang="en-US" sz="3200" dirty="0" smtClean="0"/>
+              <a:t>Total = 321; 264 unique (82%)</a:t>
+            </a:r>
+            <a:endParaRPr lang="en-US" sz="3200" dirty="0"/>
+          </a:p>
+        </p:txBody>
+      </p:sp>
+    </p:spTree>
+    <p:extLst>
+      <p:ext uri="{BB962C8B-B14F-4D97-AF65-F5344CB8AC3E}">
+        <p14:creationId xmlns:p14="http://schemas.microsoft.com/office/powerpoint/2010/main" val="3001797542"/>
+      </p:ext>
+    </p:extLst>
+  </p:cSld>
+  <p:clrMapOvr>
+    <a:masterClrMapping/>
+  </p:clrMapOvr>
+</p:sld>
+</file>
+
+<file path=ppt/slides/slide4.xml><?xml version="1.0" encoding="utf-8"?>
+<p:sld xmlns:a="http://schemas.openxmlformats.org/drawingml/2006/main" xmlns:r="http://schemas.openxmlformats.org/officeDocument/2006/relationships" xmlns:p="http://schemas.openxmlformats.org/presentationml/2006/main">
+  <p:cSld>
+    <p:spTree>
+      <p:nvGrpSpPr>
+        <p:cNvPr id="1" name=""/>
+        <p:cNvGrpSpPr/>
+        <p:nvPr/>
+      </p:nvGrpSpPr>
+      <p:grpSpPr>
+        <a:xfrm>
+          <a:off x="0" y="0"/>
+          <a:ext cx="0" cy="0"/>
+          <a:chOff x="0" y="0"/>
+          <a:chExt cx="0" cy="0"/>
+        </a:xfrm>
+      </p:grpSpPr>
+      <p:sp>
+        <p:nvSpPr>
+          <p:cNvPr id="4" name="Content Placeholder 2">
+            <a:extLst>
+              <a:ext uri="{FF2B5EF4-FFF2-40B4-BE49-F238E27FC236}">
+                <a16:creationId xmlns:a16="http://schemas.microsoft.com/office/drawing/2014/main" id="{3722BA8A-017E-184B-AD0F-CA71D6B3889A}"/>
+              </a:ext>
+            </a:extLst>
+          </p:cNvPr>
+          <p:cNvSpPr txBox="1">
+            <a:spLocks/>
+          </p:cNvSpPr>
+          <p:nvPr/>
+        </p:nvSpPr>
+        <p:spPr>
+          <a:xfrm>
+            <a:off x="781050" y="2176145"/>
+            <a:ext cx="7886700" cy="4351338"/>
+          </a:xfrm>
+          <a:prstGeom prst="rect">
+            <a:avLst/>
+          </a:prstGeom>
+        </p:spPr>
+        <p:txBody>
+          <a:bodyPr vert="horz" lIns="91440" tIns="45720" rIns="91440" bIns="45720" rtlCol="0">
+            <a:normAutofit/>
+          </a:bodyPr>
+          <a:lstStyle>
+            <a:lvl1pPr marL="228600" indent="-228600" algn="l" defTabSz="914400" rtl="0" eaLnBrk="1" latinLnBrk="0" hangingPunct="1">
+              <a:lnSpc>
+                <a:spcPct val="90000"/>
+              </a:lnSpc>
+              <a:spcBef>
+                <a:spcPts val="1000"/>
+              </a:spcBef>
+              <a:buFont typeface="Arial" panose="020B0604020202020204" pitchFamily="34" charset="0"/>
+              <a:buChar char="•"/>
+              <a:defRPr sz="2800" kern="1200">
+                <a:solidFill>
+                  <a:schemeClr val="tx1"/>
+                </a:solidFill>
+                <a:latin typeface="+mn-lt"/>
+                <a:ea typeface="+mn-ea"/>
+                <a:cs typeface="+mn-cs"/>
+              </a:defRPr>
+            </a:lvl1pPr>
+            <a:lvl2pPr marL="685800" indent="-228600" algn="l" defTabSz="914400" rtl="0" eaLnBrk="1" latinLnBrk="0" hangingPunct="1">
+              <a:lnSpc>
+                <a:spcPct val="90000"/>
+              </a:lnSpc>
+              <a:spcBef>
+                <a:spcPts val="500"/>
+              </a:spcBef>
+              <a:buFont typeface="Arial" panose="020B0604020202020204" pitchFamily="34" charset="0"/>
+              <a:buChar char="•"/>
+              <a:defRPr sz="2400" kern="1200">
+                <a:solidFill>
+                  <a:schemeClr val="tx1"/>
+                </a:solidFill>
+                <a:latin typeface="+mn-lt"/>
+                <a:ea typeface="+mn-ea"/>
+                <a:cs typeface="+mn-cs"/>
+              </a:defRPr>
+            </a:lvl2pPr>
+            <a:lvl3pPr marL="1143000" indent="-228600" algn="l" defTabSz="914400" rtl="0" eaLnBrk="1" latinLnBrk="0" hangingPunct="1">
+              <a:lnSpc>
+                <a:spcPct val="90000"/>
+              </a:lnSpc>
+              <a:spcBef>
+                <a:spcPts val="500"/>
+              </a:spcBef>
+              <a:buFont typeface="Arial" panose="020B0604020202020204" pitchFamily="34" charset="0"/>
+              <a:buChar char="•"/>
+              <a:defRPr sz="2000" kern="1200">
+                <a:solidFill>
+                  <a:schemeClr val="tx1"/>
+                </a:solidFill>
+                <a:latin typeface="+mn-lt"/>
+                <a:ea typeface="+mn-ea"/>
+                <a:cs typeface="+mn-cs"/>
+              </a:defRPr>
+            </a:lvl3pPr>
+            <a:lvl4pPr marL="1600200" indent="-228600" algn="l" defTabSz="914400" rtl="0" eaLnBrk="1" latinLnBrk="0" hangingPunct="1">
+              <a:lnSpc>
+                <a:spcPct val="90000"/>
+              </a:lnSpc>
+              <a:spcBef>
+                <a:spcPts val="500"/>
+              </a:spcBef>
+              <a:buFont typeface="Arial" panose="020B0604020202020204" pitchFamily="34" charset="0"/>
+              <a:buChar char="•"/>
+              <a:defRPr sz="1800" kern="1200">
+                <a:solidFill>
+                  <a:schemeClr val="tx1"/>
+                </a:solidFill>
+                <a:latin typeface="+mn-lt"/>
+                <a:ea typeface="+mn-ea"/>
+                <a:cs typeface="+mn-cs"/>
+              </a:defRPr>
+            </a:lvl4pPr>
+            <a:lvl5pPr marL="2057400" indent="-228600" algn="l" defTabSz="914400" rtl="0" eaLnBrk="1" latinLnBrk="0" hangingPunct="1">
+              <a:lnSpc>
+                <a:spcPct val="90000"/>
+              </a:lnSpc>
+              <a:spcBef>
+                <a:spcPts val="500"/>
+              </a:spcBef>
+              <a:buFont typeface="Arial" panose="020B0604020202020204" pitchFamily="34" charset="0"/>
+              <a:buChar char="•"/>
+              <a:defRPr sz="1800" kern="1200">
+                <a:solidFill>
+                  <a:schemeClr val="tx1"/>
+                </a:solidFill>
+                <a:latin typeface="+mn-lt"/>
+                <a:ea typeface="+mn-ea"/>
+                <a:cs typeface="+mn-cs"/>
+              </a:defRPr>
+            </a:lvl5pPr>
+            <a:lvl6pPr marL="2514600" indent="-228600" algn="l" defTabSz="914400" rtl="0" eaLnBrk="1" latinLnBrk="0" hangingPunct="1">
+              <a:lnSpc>
+                <a:spcPct val="90000"/>
+              </a:lnSpc>
+              <a:spcBef>
+                <a:spcPts val="500"/>
+              </a:spcBef>
+              <a:buFont typeface="Arial" panose="020B0604020202020204" pitchFamily="34" charset="0"/>
+              <a:buChar char="•"/>
+              <a:defRPr sz="1800" kern="1200">
+                <a:solidFill>
+                  <a:schemeClr val="tx1"/>
+                </a:solidFill>
+                <a:latin typeface="+mn-lt"/>
+                <a:ea typeface="+mn-ea"/>
+                <a:cs typeface="+mn-cs"/>
+              </a:defRPr>
+            </a:lvl6pPr>
+            <a:lvl7pPr marL="2971800" indent="-228600" algn="l" defTabSz="914400" rtl="0" eaLnBrk="1" latinLnBrk="0" hangingPunct="1">
+              <a:lnSpc>
+                <a:spcPct val="90000"/>
+              </a:lnSpc>
+              <a:spcBef>
+                <a:spcPts val="500"/>
+              </a:spcBef>
+              <a:buFont typeface="Arial" panose="020B0604020202020204" pitchFamily="34" charset="0"/>
+              <a:buChar char="•"/>
+              <a:defRPr sz="1800" kern="1200">
+                <a:solidFill>
+                  <a:schemeClr val="tx1"/>
+                </a:solidFill>
+                <a:latin typeface="+mn-lt"/>
+                <a:ea typeface="+mn-ea"/>
+                <a:cs typeface="+mn-cs"/>
+              </a:defRPr>
+            </a:lvl7pPr>
+            <a:lvl8pPr marL="3429000" indent="-228600" algn="l" defTabSz="914400" rtl="0" eaLnBrk="1" latinLnBrk="0" hangingPunct="1">
+              <a:lnSpc>
+                <a:spcPct val="90000"/>
+              </a:lnSpc>
+              <a:spcBef>
+                <a:spcPts val="500"/>
+              </a:spcBef>
+              <a:buFont typeface="Arial" panose="020B0604020202020204" pitchFamily="34" charset="0"/>
+              <a:buChar char="•"/>
+              <a:defRPr sz="1800" kern="1200">
+                <a:solidFill>
+                  <a:schemeClr val="tx1"/>
+                </a:solidFill>
+                <a:latin typeface="+mn-lt"/>
+                <a:ea typeface="+mn-ea"/>
+                <a:cs typeface="+mn-cs"/>
+              </a:defRPr>
+            </a:lvl8pPr>
+            <a:lvl9pPr marL="3886200" indent="-228600" algn="l" defTabSz="914400" rtl="0" eaLnBrk="1" latinLnBrk="0" hangingPunct="1">
+              <a:lnSpc>
+                <a:spcPct val="90000"/>
+              </a:lnSpc>
+              <a:spcBef>
+                <a:spcPts val="500"/>
+              </a:spcBef>
+              <a:buFont typeface="Arial" panose="020B0604020202020204" pitchFamily="34" charset="0"/>
+              <a:buChar char="•"/>
+              <a:defRPr sz="1800" kern="1200">
+                <a:solidFill>
+                  <a:schemeClr val="tx1"/>
+                </a:solidFill>
+                <a:latin typeface="+mn-lt"/>
+                <a:ea typeface="+mn-ea"/>
+                <a:cs typeface="+mn-cs"/>
+              </a:defRPr>
+            </a:lvl9pPr>
+          </a:lstStyle>
+          <a:p>
+            <a:endParaRPr lang="en-US" dirty="0" smtClean="0"/>
+          </a:p>
+          <a:p>
+            <a:endParaRPr lang="en-US" dirty="0"/>
+          </a:p>
+          <a:p>
+            <a:endParaRPr lang="en-US" dirty="0" smtClean="0"/>
+          </a:p>
+          <a:p>
+            <a:endParaRPr lang="en-US" dirty="0"/>
+          </a:p>
+          <a:p>
+            <a:endParaRPr lang="en-US" dirty="0" smtClean="0"/>
+          </a:p>
+          <a:p>
+            <a:r>
+              <a:rPr lang="en-US" dirty="0" smtClean="0"/>
+              <a:t>Curriculum </a:t>
+            </a:r>
+          </a:p>
+          <a:p>
+            <a:pPr lvl="1"/>
+            <a:r>
+              <a:rPr lang="en-US" dirty="0" smtClean="0"/>
+              <a:t>Start: Intro, </a:t>
+            </a:r>
+            <a:r>
+              <a:rPr lang="en-US" dirty="0" err="1" smtClean="0"/>
+              <a:t>Viz</a:t>
+            </a:r>
+            <a:r>
+              <a:rPr lang="en-US" dirty="0" smtClean="0"/>
+              <a:t>, Data </a:t>
+            </a:r>
+            <a:r>
+              <a:rPr lang="en-US" dirty="0" err="1" smtClean="0"/>
+              <a:t>Mgmt</a:t>
+            </a:r>
+            <a:r>
+              <a:rPr lang="en-US" dirty="0" smtClean="0"/>
+              <a:t>, Sup Learning</a:t>
+            </a:r>
+          </a:p>
+          <a:p>
+            <a:pPr lvl="1"/>
+            <a:r>
+              <a:rPr lang="en-US" dirty="0" smtClean="0"/>
+              <a:t>Added: Data </a:t>
+            </a:r>
+            <a:r>
+              <a:rPr lang="en-US" dirty="0" err="1" smtClean="0"/>
+              <a:t>Mgmt</a:t>
+            </a:r>
+            <a:r>
+              <a:rPr lang="en-US" dirty="0" smtClean="0"/>
+              <a:t> v2, Big Data, </a:t>
+            </a:r>
+            <a:r>
+              <a:rPr lang="en-US" dirty="0" err="1" smtClean="0"/>
+              <a:t>Unsup</a:t>
+            </a:r>
+            <a:r>
+              <a:rPr lang="en-US" dirty="0" smtClean="0"/>
+              <a:t> Learning</a:t>
+            </a:r>
+          </a:p>
+          <a:p>
+            <a:pPr lvl="1"/>
+            <a:r>
+              <a:rPr lang="en-US" dirty="0" err="1" smtClean="0"/>
+              <a:t>Futre</a:t>
+            </a:r>
+            <a:r>
+              <a:rPr lang="en-US" dirty="0" smtClean="0"/>
+              <a:t>: Math for DSCI, Gen Ed DSCI, a DSCI 101</a:t>
+            </a:r>
+            <a:endParaRPr lang="en-US" dirty="0"/>
+          </a:p>
+        </p:txBody>
+      </p:sp>
+      <p:sp>
+        <p:nvSpPr>
+          <p:cNvPr id="5" name="Title 1">
+            <a:extLst>
+              <a:ext uri="{FF2B5EF4-FFF2-40B4-BE49-F238E27FC236}">
+                <a16:creationId xmlns:a16="http://schemas.microsoft.com/office/drawing/2014/main" id="{5FC12995-239A-0143-8905-3A0BA23BBC2E}"/>
+              </a:ext>
+            </a:extLst>
+          </p:cNvPr>
+          <p:cNvSpPr>
+            <a:spLocks noGrp="1"/>
+          </p:cNvSpPr>
+          <p:nvPr>
+            <p:ph type="title"/>
+          </p:nvPr>
+        </p:nvSpPr>
+        <p:spPr>
+          <a:xfrm>
+            <a:off x="628650" y="365126"/>
+            <a:ext cx="7886700" cy="1325563"/>
+          </a:xfrm>
+        </p:spPr>
+        <p:txBody>
+          <a:bodyPr/>
+          <a:lstStyle/>
+          <a:p>
+            <a:r>
+              <a:rPr lang="en-US" dirty="0"/>
+              <a:t>Data Science at WSU</a:t>
+            </a:r>
+            <a:br>
+              <a:rPr lang="en-US" dirty="0"/>
+            </a:br>
+            <a:r>
+              <a:rPr lang="en-US" sz="3200" dirty="0"/>
+              <a:t>A </a:t>
+            </a:r>
+            <a:r>
+              <a:rPr lang="en-US" sz="3200" dirty="0" smtClean="0"/>
+              <a:t>Little History</a:t>
+            </a:r>
+            <a:endParaRPr lang="en-US" sz="3200" dirty="0"/>
+          </a:p>
+        </p:txBody>
+      </p:sp>
+      <p:grpSp>
+        <p:nvGrpSpPr>
+          <p:cNvPr id="12" name="Group 11"/>
+          <p:cNvGrpSpPr/>
+          <p:nvPr/>
+        </p:nvGrpSpPr>
+        <p:grpSpPr>
+          <a:xfrm>
+            <a:off x="1644070" y="1664176"/>
+            <a:ext cx="5981010" cy="3054752"/>
+            <a:chOff x="3620190" y="1344528"/>
+            <a:chExt cx="5772730" cy="2935590"/>
+          </a:xfrm>
+        </p:grpSpPr>
+        <p:grpSp>
+          <p:nvGrpSpPr>
+            <p:cNvPr id="6" name="Group 5"/>
+            <p:cNvGrpSpPr/>
+            <p:nvPr/>
+          </p:nvGrpSpPr>
+          <p:grpSpPr>
+            <a:xfrm>
+              <a:off x="4724400" y="1344528"/>
+              <a:ext cx="3123946" cy="2586699"/>
+              <a:chOff x="2989697" y="2029316"/>
+              <a:chExt cx="3101340" cy="2568946"/>
+            </a:xfrm>
+          </p:grpSpPr>
+          <p:pic>
+            <p:nvPicPr>
+              <p:cNvPr id="7" name="Picture 2" descr="http://scpresbyterianpilgrimage.weebly.com/uploads/7/4/5/5/7455594/3499065.jpg?412"/>
+              <p:cNvPicPr>
+                <a:picLocks noChangeAspect="1" noChangeArrowheads="1"/>
+              </p:cNvPicPr>
+              <p:nvPr/>
+            </p:nvPicPr>
+            <p:blipFill>
+              <a:blip r:embed="rId2">
+                <a:extLst>
+                  <a:ext uri="{28A0092B-C50C-407E-A947-70E740481C1C}">
+                    <a14:useLocalDpi xmlns:a14="http://schemas.microsoft.com/office/drawing/2010/main" val="0"/>
+                  </a:ext>
+                </a:extLst>
+              </a:blip>
+              <a:srcRect/>
+              <a:stretch>
+                <a:fillRect/>
+              </a:stretch>
+            </p:blipFill>
+            <p:spPr bwMode="auto">
+              <a:xfrm>
+                <a:off x="3296017" y="2029316"/>
+                <a:ext cx="2568945" cy="2568946"/>
+              </a:xfrm>
+              <a:prstGeom prst="rect">
+                <a:avLst/>
+              </a:prstGeom>
+              <a:noFill/>
+              <a:extLst>
+                <a:ext uri="{909E8E84-426E-40DD-AFC4-6F175D3DCCD1}">
+                  <a14:hiddenFill xmlns:a14="http://schemas.microsoft.com/office/drawing/2010/main">
+                    <a:solidFill>
+                      <a:srgbClr val="FFFFFF"/>
+                    </a:solidFill>
+                  </a14:hiddenFill>
+                </a:ext>
+              </a:extLst>
+            </p:spPr>
+          </p:pic>
+          <p:sp>
+            <p:nvSpPr>
+              <p:cNvPr id="8" name="TextBox 7"/>
+              <p:cNvSpPr txBox="1"/>
+              <p:nvPr/>
+            </p:nvSpPr>
+            <p:spPr>
+              <a:xfrm>
+                <a:off x="2989697" y="2293860"/>
+                <a:ext cx="3101340" cy="519629"/>
+              </a:xfrm>
+              <a:prstGeom prst="rect">
+                <a:avLst/>
+              </a:prstGeom>
+              <a:noFill/>
+            </p:spPr>
+            <p:txBody>
+              <a:bodyPr wrap="square" rtlCol="0">
+                <a:spAutoFit/>
+              </a:bodyPr>
+              <a:lstStyle/>
+              <a:p>
+                <a:pPr algn="ctr"/>
+                <a:r>
+                  <a:rPr lang="en-US" sz="1400" b="1" dirty="0"/>
+                  <a:t>Data Science </a:t>
+                </a:r>
+              </a:p>
+              <a:p>
+                <a:pPr algn="ctr"/>
+                <a:r>
+                  <a:rPr lang="en-US" sz="1400" b="1" dirty="0"/>
+                  <a:t>@ Winona State</a:t>
+                </a:r>
+                <a:endParaRPr lang="en-US" sz="1100" dirty="0"/>
+              </a:p>
+            </p:txBody>
+          </p:sp>
+        </p:grpSp>
+        <p:sp>
+          <p:nvSpPr>
+            <p:cNvPr id="9" name="TextBox 8"/>
+            <p:cNvSpPr txBox="1"/>
+            <p:nvPr/>
+          </p:nvSpPr>
+          <p:spPr>
+            <a:xfrm>
+              <a:off x="3620190" y="3469745"/>
+              <a:ext cx="2208419" cy="400110"/>
+            </a:xfrm>
+            <a:prstGeom prst="rect">
+              <a:avLst/>
+            </a:prstGeom>
+            <a:noFill/>
+          </p:spPr>
+          <p:txBody>
+            <a:bodyPr wrap="square" rtlCol="0">
+              <a:spAutoFit/>
+            </a:bodyPr>
+            <a:lstStyle/>
+            <a:p>
+              <a:pPr algn="ctr"/>
+              <a:r>
+                <a:rPr lang="en-US" sz="2000" dirty="0"/>
+                <a:t>Computational</a:t>
+              </a:r>
+            </a:p>
+          </p:txBody>
+        </p:sp>
+        <p:sp>
+          <p:nvSpPr>
+            <p:cNvPr id="10" name="TextBox 9"/>
+            <p:cNvSpPr txBox="1"/>
+            <p:nvPr/>
+          </p:nvSpPr>
+          <p:spPr>
+            <a:xfrm>
+              <a:off x="5301571" y="3238913"/>
+              <a:ext cx="2050433" cy="400110"/>
+            </a:xfrm>
+            <a:prstGeom prst="rect">
+              <a:avLst/>
+            </a:prstGeom>
+            <a:noFill/>
+          </p:spPr>
+          <p:txBody>
+            <a:bodyPr wrap="square" rtlCol="0">
+              <a:spAutoFit/>
+            </a:bodyPr>
+            <a:lstStyle/>
+            <a:p>
+              <a:pPr algn="ctr"/>
+              <a:r>
+                <a:rPr lang="en-US" sz="2000" dirty="0"/>
+                <a:t>Analytical</a:t>
+              </a:r>
+            </a:p>
+          </p:txBody>
+        </p:sp>
+        <p:sp>
+          <p:nvSpPr>
+            <p:cNvPr id="11" name="TextBox 10"/>
+            <p:cNvSpPr txBox="1"/>
+            <p:nvPr/>
+          </p:nvSpPr>
+          <p:spPr>
+            <a:xfrm>
+              <a:off x="7015423" y="3572232"/>
+              <a:ext cx="2377497" cy="707886"/>
+            </a:xfrm>
+            <a:prstGeom prst="rect">
+              <a:avLst/>
+            </a:prstGeom>
+            <a:noFill/>
+          </p:spPr>
+          <p:txBody>
+            <a:bodyPr wrap="square" rtlCol="0">
+              <a:spAutoFit/>
+            </a:bodyPr>
+            <a:lstStyle/>
+            <a:p>
+              <a:r>
+                <a:rPr lang="en-US" sz="2000" dirty="0" smtClean="0"/>
+                <a:t>Interdisciplinary </a:t>
+              </a:r>
+              <a:r>
+                <a:rPr lang="en-US" sz="2000" dirty="0" smtClean="0"/>
+                <a:t> / </a:t>
+              </a:r>
+              <a:br>
+                <a:rPr lang="en-US" sz="2000" dirty="0" smtClean="0"/>
+              </a:br>
+              <a:r>
+                <a:rPr lang="en-US" sz="2000" dirty="0" smtClean="0"/>
+                <a:t>Soft Skills</a:t>
+              </a:r>
+              <a:endParaRPr lang="en-US" sz="2000" dirty="0"/>
+            </a:p>
+          </p:txBody>
+        </p:sp>
+      </p:grpSp>
+    </p:spTree>
+    <p:extLst>
+      <p:ext uri="{BB962C8B-B14F-4D97-AF65-F5344CB8AC3E}">
+        <p14:creationId xmlns:p14="http://schemas.microsoft.com/office/powerpoint/2010/main" val="2967542088"/>
+      </p:ext>
+    </p:extLst>
+  </p:cSld>
+  <p:clrMapOvr>
+    <a:masterClrMapping/>
+  </p:clrMapOvr>
+</p:sld>
+</file>
+
+<file path=ppt/slides/slide5.xml><?xml version="1.0" encoding="utf-8"?>
 <p:sld xmlns:a="http://schemas.openxmlformats.org/drawingml/2006/main" xmlns:r="http://schemas.openxmlformats.org/officeDocument/2006/relationships" xmlns:p="http://schemas.openxmlformats.org/presentationml/2006/main">
   <p:cSld>
     <p:spTree>
@@ -4177,8 +6820,8 @@
             </p:nvSpPr>
             <p:spPr>
               <a:xfrm>
-                <a:off x="6108545" y="1618183"/>
-                <a:ext cx="2590837" cy="461665"/>
+                <a:off x="6491798" y="1618183"/>
+                <a:ext cx="1572277" cy="461665"/>
               </a:xfrm>
               <a:prstGeom prst="rect">
                 <a:avLst/>
@@ -4191,15 +6834,17 @@
               </a:ln>
             </p:spPr>
             <p:txBody>
-              <a:bodyPr wrap="none" rtlCol="0">
+              <a:bodyPr wrap="square" rtlCol="0">
                 <a:spAutoFit/>
               </a:bodyPr>
               <a:lstStyle/>
               <a:p>
+                <a:pPr algn="ctr"/>
                 <a:r>
-                  <a:rPr lang="en-US" sz="2400" b="1" dirty="0"/>
-                  <a:t>Statistical Learning</a:t>
+                  <a:rPr lang="en-US" sz="2400" b="1" dirty="0" smtClean="0"/>
+                  <a:t>Analytical</a:t>
                 </a:r>
+                <a:endParaRPr lang="en-US" sz="2400" b="1" dirty="0"/>
               </a:p>
             </p:txBody>
           </p:sp>
@@ -4761,7 +7406,7 @@
 </p:sld>
 </file>
 
-<file path=ppt/slides/slide4.xml><?xml version="1.0" encoding="utf-8"?>
+<file path=ppt/slides/slide6.xml><?xml version="1.0" encoding="utf-8"?>
 <p:sld xmlns:a="http://schemas.openxmlformats.org/drawingml/2006/main" xmlns:r="http://schemas.openxmlformats.org/officeDocument/2006/relationships" xmlns:p="http://schemas.openxmlformats.org/presentationml/2006/main">
   <p:cSld>
     <p:spTree>
@@ -5797,46 +8442,6 @@
               <a:chExt cx="3105521" cy="4076985"/>
             </a:xfrm>
           </p:grpSpPr>
-          <p:sp>
-            <p:nvSpPr>
-              <p:cNvPr id="6" name="TextBox 5">
-                <a:extLst>
-                  <a:ext uri="{FF2B5EF4-FFF2-40B4-BE49-F238E27FC236}">
-                    <a16:creationId xmlns:a16="http://schemas.microsoft.com/office/drawing/2014/main" id="{2DE0D2D2-39D8-5B4E-837E-363B811F4CF0}"/>
-                  </a:ext>
-                </a:extLst>
-              </p:cNvPr>
-              <p:cNvSpPr txBox="1"/>
-              <p:nvPr/>
-            </p:nvSpPr>
-            <p:spPr>
-              <a:xfrm>
-                <a:off x="6108545" y="1618183"/>
-                <a:ext cx="2590837" cy="461665"/>
-              </a:xfrm>
-              <a:prstGeom prst="rect">
-                <a:avLst/>
-              </a:prstGeom>
-              <a:noFill/>
-              <a:ln w="38100">
-                <a:solidFill>
-                  <a:schemeClr val="tx1"/>
-                </a:solidFill>
-              </a:ln>
-            </p:spPr>
-            <p:txBody>
-              <a:bodyPr wrap="none" rtlCol="0">
-                <a:spAutoFit/>
-              </a:bodyPr>
-              <a:lstStyle/>
-              <a:p>
-                <a:r>
-                  <a:rPr lang="en-US" sz="2400" b="1" dirty="0"/>
-                  <a:t>Statistical Learning</a:t>
-                </a:r>
-              </a:p>
-            </p:txBody>
-          </p:sp>
           <p:grpSp>
             <p:nvGrpSpPr>
               <p:cNvPr id="93" name="Group 92">
@@ -6431,6 +9036,48 @@
           </p:sp>
         </p:grpSp>
       </p:grpSp>
+      <p:sp>
+        <p:nvSpPr>
+          <p:cNvPr id="36" name="TextBox 35">
+            <a:extLst>
+              <a:ext uri="{FF2B5EF4-FFF2-40B4-BE49-F238E27FC236}">
+                <a16:creationId xmlns:a16="http://schemas.microsoft.com/office/drawing/2014/main" id="{2DE0D2D2-39D8-5B4E-837E-363B811F4CF0}"/>
+              </a:ext>
+            </a:extLst>
+          </p:cNvPr>
+          <p:cNvSpPr txBox="1"/>
+          <p:nvPr/>
+        </p:nvSpPr>
+        <p:spPr>
+          <a:xfrm>
+            <a:off x="6563360" y="1952138"/>
+            <a:ext cx="1572277" cy="461665"/>
+          </a:xfrm>
+          <a:prstGeom prst="rect">
+            <a:avLst/>
+          </a:prstGeom>
+          <a:noFill/>
+          <a:ln w="38100">
+            <a:solidFill>
+              <a:schemeClr val="tx1"/>
+            </a:solidFill>
+          </a:ln>
+        </p:spPr>
+        <p:txBody>
+          <a:bodyPr wrap="square" rtlCol="0">
+            <a:spAutoFit/>
+          </a:bodyPr>
+          <a:lstStyle/>
+          <a:p>
+            <a:pPr algn="ctr"/>
+            <a:r>
+              <a:rPr lang="en-US" sz="2400" b="1" dirty="0" smtClean="0"/>
+              <a:t>Analytical</a:t>
+            </a:r>
+            <a:endParaRPr lang="en-US" sz="2400" b="1" dirty="0"/>
+          </a:p>
+        </p:txBody>
+      </p:sp>
     </p:spTree>
     <p:extLst>
       <p:ext uri="{BB962C8B-B14F-4D97-AF65-F5344CB8AC3E}">
@@ -6444,7 +9091,7 @@
 </p:sld>
 </file>
 
-<file path=ppt/slides/slide5.xml><?xml version="1.0" encoding="utf-8"?>
+<file path=ppt/slides/slide7.xml><?xml version="1.0" encoding="utf-8"?>
 <p:sld xmlns:a="http://schemas.openxmlformats.org/drawingml/2006/main" xmlns:r="http://schemas.openxmlformats.org/officeDocument/2006/relationships" xmlns:p="http://schemas.openxmlformats.org/presentationml/2006/main">
   <p:cSld>
     <p:spTree>
@@ -7487,46 +10134,6 @@
               <a:chExt cx="3105521" cy="4076985"/>
             </a:xfrm>
           </p:grpSpPr>
-          <p:sp>
-            <p:nvSpPr>
-              <p:cNvPr id="6" name="TextBox 5">
-                <a:extLst>
-                  <a:ext uri="{FF2B5EF4-FFF2-40B4-BE49-F238E27FC236}">
-                    <a16:creationId xmlns:a16="http://schemas.microsoft.com/office/drawing/2014/main" id="{2DE0D2D2-39D8-5B4E-837E-363B811F4CF0}"/>
-                  </a:ext>
-                </a:extLst>
-              </p:cNvPr>
-              <p:cNvSpPr txBox="1"/>
-              <p:nvPr/>
-            </p:nvSpPr>
-            <p:spPr>
-              <a:xfrm>
-                <a:off x="6108545" y="1618183"/>
-                <a:ext cx="2590837" cy="461665"/>
-              </a:xfrm>
-              <a:prstGeom prst="rect">
-                <a:avLst/>
-              </a:prstGeom>
-              <a:noFill/>
-              <a:ln w="38100">
-                <a:solidFill>
-                  <a:schemeClr val="tx1"/>
-                </a:solidFill>
-              </a:ln>
-            </p:spPr>
-            <p:txBody>
-              <a:bodyPr wrap="none" rtlCol="0">
-                <a:spAutoFit/>
-              </a:bodyPr>
-              <a:lstStyle/>
-              <a:p>
-                <a:r>
-                  <a:rPr lang="en-US" sz="2400" b="1" dirty="0"/>
-                  <a:t>Statistical Learning</a:t>
-                </a:r>
-              </a:p>
-            </p:txBody>
-          </p:sp>
           <p:grpSp>
             <p:nvGrpSpPr>
               <p:cNvPr id="93" name="Group 92">
@@ -8128,6 +10735,48 @@
           </p:sp>
         </p:grpSp>
       </p:grpSp>
+      <p:sp>
+        <p:nvSpPr>
+          <p:cNvPr id="36" name="TextBox 35">
+            <a:extLst>
+              <a:ext uri="{FF2B5EF4-FFF2-40B4-BE49-F238E27FC236}">
+                <a16:creationId xmlns:a16="http://schemas.microsoft.com/office/drawing/2014/main" id="{2DE0D2D2-39D8-5B4E-837E-363B811F4CF0}"/>
+              </a:ext>
+            </a:extLst>
+          </p:cNvPr>
+          <p:cNvSpPr txBox="1"/>
+          <p:nvPr/>
+        </p:nvSpPr>
+        <p:spPr>
+          <a:xfrm>
+            <a:off x="6563360" y="1952138"/>
+            <a:ext cx="1572277" cy="461665"/>
+          </a:xfrm>
+          <a:prstGeom prst="rect">
+            <a:avLst/>
+          </a:prstGeom>
+          <a:noFill/>
+          <a:ln w="38100">
+            <a:solidFill>
+              <a:schemeClr val="tx1"/>
+            </a:solidFill>
+          </a:ln>
+        </p:spPr>
+        <p:txBody>
+          <a:bodyPr wrap="square" rtlCol="0">
+            <a:spAutoFit/>
+          </a:bodyPr>
+          <a:lstStyle/>
+          <a:p>
+            <a:pPr algn="ctr"/>
+            <a:r>
+              <a:rPr lang="en-US" sz="2400" b="1" dirty="0" smtClean="0"/>
+              <a:t>Analytical</a:t>
+            </a:r>
+            <a:endParaRPr lang="en-US" sz="2400" b="1" dirty="0"/>
+          </a:p>
+        </p:txBody>
+      </p:sp>
     </p:spTree>
     <p:extLst>
       <p:ext uri="{BB962C8B-B14F-4D97-AF65-F5344CB8AC3E}">
@@ -8141,7 +10790,7 @@
 </p:sld>
 </file>
 
-<file path=ppt/slides/slide6.xml><?xml version="1.0" encoding="utf-8"?>
+<file path=ppt/slides/slide8.xml><?xml version="1.0" encoding="utf-8"?>
 <p:sld xmlns:a="http://schemas.openxmlformats.org/drawingml/2006/main" xmlns:r="http://schemas.openxmlformats.org/officeDocument/2006/relationships" xmlns:p="http://schemas.openxmlformats.org/presentationml/2006/main">
   <p:cSld>
     <p:spTree>
@@ -9163,46 +11812,6 @@
               <a:chExt cx="3105521" cy="4076985"/>
             </a:xfrm>
           </p:grpSpPr>
-          <p:sp>
-            <p:nvSpPr>
-              <p:cNvPr id="6" name="TextBox 5">
-                <a:extLst>
-                  <a:ext uri="{FF2B5EF4-FFF2-40B4-BE49-F238E27FC236}">
-                    <a16:creationId xmlns:a16="http://schemas.microsoft.com/office/drawing/2014/main" id="{2DE0D2D2-39D8-5B4E-837E-363B811F4CF0}"/>
-                  </a:ext>
-                </a:extLst>
-              </p:cNvPr>
-              <p:cNvSpPr txBox="1"/>
-              <p:nvPr/>
-            </p:nvSpPr>
-            <p:spPr>
-              <a:xfrm>
-                <a:off x="6108545" y="1618183"/>
-                <a:ext cx="2590837" cy="461665"/>
-              </a:xfrm>
-              <a:prstGeom prst="rect">
-                <a:avLst/>
-              </a:prstGeom>
-              <a:noFill/>
-              <a:ln w="38100">
-                <a:solidFill>
-                  <a:schemeClr val="tx1"/>
-                </a:solidFill>
-              </a:ln>
-            </p:spPr>
-            <p:txBody>
-              <a:bodyPr wrap="none" rtlCol="0">
-                <a:spAutoFit/>
-              </a:bodyPr>
-              <a:lstStyle/>
-              <a:p>
-                <a:r>
-                  <a:rPr lang="en-US" sz="2400" b="1" dirty="0"/>
-                  <a:t>Statistical Learning</a:t>
-                </a:r>
-              </a:p>
-            </p:txBody>
-          </p:sp>
           <p:grpSp>
             <p:nvGrpSpPr>
               <p:cNvPr id="93" name="Group 92">
@@ -9804,6 +12413,48 @@
           </p:sp>
         </p:grpSp>
       </p:grpSp>
+      <p:sp>
+        <p:nvSpPr>
+          <p:cNvPr id="36" name="TextBox 35">
+            <a:extLst>
+              <a:ext uri="{FF2B5EF4-FFF2-40B4-BE49-F238E27FC236}">
+                <a16:creationId xmlns:a16="http://schemas.microsoft.com/office/drawing/2014/main" id="{2DE0D2D2-39D8-5B4E-837E-363B811F4CF0}"/>
+              </a:ext>
+            </a:extLst>
+          </p:cNvPr>
+          <p:cNvSpPr txBox="1"/>
+          <p:nvPr/>
+        </p:nvSpPr>
+        <p:spPr>
+          <a:xfrm>
+            <a:off x="6563360" y="1952138"/>
+            <a:ext cx="1572277" cy="461665"/>
+          </a:xfrm>
+          <a:prstGeom prst="rect">
+            <a:avLst/>
+          </a:prstGeom>
+          <a:noFill/>
+          <a:ln w="38100">
+            <a:solidFill>
+              <a:schemeClr val="tx1"/>
+            </a:solidFill>
+          </a:ln>
+        </p:spPr>
+        <p:txBody>
+          <a:bodyPr wrap="square" rtlCol="0">
+            <a:spAutoFit/>
+          </a:bodyPr>
+          <a:lstStyle/>
+          <a:p>
+            <a:pPr algn="ctr"/>
+            <a:r>
+              <a:rPr lang="en-US" sz="2400" b="1" dirty="0" smtClean="0"/>
+              <a:t>Analytical</a:t>
+            </a:r>
+            <a:endParaRPr lang="en-US" sz="2400" b="1" dirty="0"/>
+          </a:p>
+        </p:txBody>
+      </p:sp>
     </p:spTree>
     <p:extLst>
       <p:ext uri="{BB962C8B-B14F-4D97-AF65-F5344CB8AC3E}">
@@ -9817,7 +12468,7 @@
 </p:sld>
 </file>
 
-<file path=ppt/slides/slide7.xml><?xml version="1.0" encoding="utf-8"?>
+<file path=ppt/slides/slide9.xml><?xml version="1.0" encoding="utf-8"?>
 <p:sld xmlns:a="http://schemas.openxmlformats.org/drawingml/2006/main" xmlns:r="http://schemas.openxmlformats.org/officeDocument/2006/relationships" xmlns:p="http://schemas.openxmlformats.org/presentationml/2006/main">
   <p:cSld>
     <p:spTree>
@@ -10867,46 +13518,6 @@
               <a:chExt cx="3105521" cy="4076985"/>
             </a:xfrm>
           </p:grpSpPr>
-          <p:sp>
-            <p:nvSpPr>
-              <p:cNvPr id="6" name="TextBox 5">
-                <a:extLst>
-                  <a:ext uri="{FF2B5EF4-FFF2-40B4-BE49-F238E27FC236}">
-                    <a16:creationId xmlns:a16="http://schemas.microsoft.com/office/drawing/2014/main" id="{2DE0D2D2-39D8-5B4E-837E-363B811F4CF0}"/>
-                  </a:ext>
-                </a:extLst>
-              </p:cNvPr>
-              <p:cNvSpPr txBox="1"/>
-              <p:nvPr/>
-            </p:nvSpPr>
-            <p:spPr>
-              <a:xfrm>
-                <a:off x="6108545" y="1618183"/>
-                <a:ext cx="2590837" cy="461665"/>
-              </a:xfrm>
-              <a:prstGeom prst="rect">
-                <a:avLst/>
-              </a:prstGeom>
-              <a:noFill/>
-              <a:ln w="38100">
-                <a:solidFill>
-                  <a:schemeClr val="tx1"/>
-                </a:solidFill>
-              </a:ln>
-            </p:spPr>
-            <p:txBody>
-              <a:bodyPr wrap="none" rtlCol="0">
-                <a:spAutoFit/>
-              </a:bodyPr>
-              <a:lstStyle/>
-              <a:p>
-                <a:r>
-                  <a:rPr lang="en-US" sz="2400" b="1" dirty="0"/>
-                  <a:t>Statistical Learning</a:t>
-                </a:r>
-              </a:p>
-            </p:txBody>
-          </p:sp>
           <p:grpSp>
             <p:nvGrpSpPr>
               <p:cNvPr id="93" name="Group 92">
@@ -11480,6 +14091,48 @@
           </p:sp>
         </p:grpSp>
       </p:grpSp>
+      <p:sp>
+        <p:nvSpPr>
+          <p:cNvPr id="36" name="TextBox 35">
+            <a:extLst>
+              <a:ext uri="{FF2B5EF4-FFF2-40B4-BE49-F238E27FC236}">
+                <a16:creationId xmlns:a16="http://schemas.microsoft.com/office/drawing/2014/main" id="{2DE0D2D2-39D8-5B4E-837E-363B811F4CF0}"/>
+              </a:ext>
+            </a:extLst>
+          </p:cNvPr>
+          <p:cNvSpPr txBox="1"/>
+          <p:nvPr/>
+        </p:nvSpPr>
+        <p:spPr>
+          <a:xfrm>
+            <a:off x="6563360" y="1952138"/>
+            <a:ext cx="1572277" cy="461665"/>
+          </a:xfrm>
+          <a:prstGeom prst="rect">
+            <a:avLst/>
+          </a:prstGeom>
+          <a:noFill/>
+          <a:ln w="38100">
+            <a:solidFill>
+              <a:schemeClr val="tx1"/>
+            </a:solidFill>
+          </a:ln>
+        </p:spPr>
+        <p:txBody>
+          <a:bodyPr wrap="square" rtlCol="0">
+            <a:spAutoFit/>
+          </a:bodyPr>
+          <a:lstStyle/>
+          <a:p>
+            <a:pPr algn="ctr"/>
+            <a:r>
+              <a:rPr lang="en-US" sz="2400" b="1" dirty="0" smtClean="0"/>
+              <a:t>Analytical</a:t>
+            </a:r>
+            <a:endParaRPr lang="en-US" sz="2400" b="1" dirty="0"/>
+          </a:p>
+        </p:txBody>
+      </p:sp>
     </p:spTree>
     <p:extLst>
       <p:ext uri="{BB962C8B-B14F-4D97-AF65-F5344CB8AC3E}">

</xml_diff>